<commit_message>
rcs/remotes: update slide size
</commit_message>
<xml_diff>
--- a/revisionControl/remoteRepositories/slides/overview.pptx
+++ b/revisionControl/remoteRepositories/slides/overview.pptx
@@ -2,7 +2,7 @@
 <file path=ppt/presentation.xml><?xml version="1.0" encoding="utf-8"?>
 <p:presentation xmlns:a="http://schemas.openxmlformats.org/drawingml/2006/main" xmlns:r="http://schemas.openxmlformats.org/officeDocument/2006/relationships" xmlns:p="http://schemas.openxmlformats.org/presentationml/2006/main" saveSubsetFonts="1">
   <p:sldMasterIdLst>
-    <p:sldMasterId id="2147483660" r:id="rId1"/>
+    <p:sldMasterId id="2147483678" r:id="rId1"/>
   </p:sldMasterIdLst>
   <p:notesMasterIdLst>
     <p:notesMasterId r:id="rId3"/>
@@ -10,7 +10,7 @@
   <p:sldIdLst>
     <p:sldId id="257" r:id="rId2"/>
   </p:sldIdLst>
-  <p:sldSz cx="12192000" cy="6858000"/>
+  <p:sldSz cx="9144000" cy="6858000" type="screen4x3"/>
   <p:notesSz cx="6858000" cy="9144000"/>
   <p:defaultTextStyle>
     <a:defPPr>
@@ -107,6 +107,11 @@
       </a:defRPr>
     </a:lvl9pPr>
   </p:defaultTextStyle>
+  <p:extLst>
+    <p:ext uri="{EFAFB233-063F-42B5-8137-9DF3F51BA10A}">
+      <p15:sldGuideLst xmlns:p15="http://schemas.microsoft.com/office/powerpoint/2012/main"/>
+    </p:ext>
+  </p:extLst>
 </p:presentation>
 </file>
 
@@ -210,8 +215,8 @@
         </p:nvSpPr>
         <p:spPr>
           <a:xfrm>
-            <a:off x="685800" y="1143000"/>
-            <a:ext cx="5486400" cy="3086100"/>
+            <a:off x="1371600" y="1143000"/>
+            <a:ext cx="4114800" cy="3086100"/>
           </a:xfrm>
           <a:prstGeom prst="rect">
             <a:avLst/>
@@ -487,7 +492,12 @@
             <p:ph type="sldImg"/>
           </p:nvPr>
         </p:nvSpPr>
-        <p:spPr/>
+        <p:spPr>
+          <a:xfrm>
+            <a:off x="1371600" y="1143000"/>
+            <a:ext cx="4114800" cy="3086100"/>
+          </a:xfrm>
+        </p:spPr>
       </p:sp>
       <p:sp>
         <p:nvSpPr>
@@ -823,8 +833,8 @@
         </p:nvSpPr>
         <p:spPr>
           <a:xfrm>
-            <a:off x="1154955" y="1447800"/>
-            <a:ext cx="8825658" cy="3329581"/>
+            <a:off x="866442" y="1447801"/>
+            <a:ext cx="6620968" cy="3329581"/>
           </a:xfrm>
         </p:spPr>
         <p:txBody>
@@ -855,8 +865,8 @@
         </p:nvSpPr>
         <p:spPr>
           <a:xfrm>
-            <a:off x="1154955" y="4777380"/>
-            <a:ext cx="8825658" cy="861420"/>
+            <a:off x="866442" y="4777380"/>
+            <a:ext cx="6620968" cy="861420"/>
           </a:xfrm>
         </p:spPr>
         <p:txBody>
@@ -1031,7 +1041,7 @@
     </p:spTree>
     <p:extLst>
       <p:ext uri="{BB962C8B-B14F-4D97-AF65-F5344CB8AC3E}">
-        <p14:creationId xmlns:p14="http://schemas.microsoft.com/office/powerpoint/2010/main" val="1825141195"/>
+        <p14:creationId xmlns:p14="http://schemas.microsoft.com/office/powerpoint/2010/main" val="780286089"/>
       </p:ext>
     </p:extLst>
   </p:cSld>
@@ -1070,8 +1080,8 @@
         </p:nvSpPr>
         <p:spPr>
           <a:xfrm>
-            <a:off x="1154956" y="4800587"/>
-            <a:ext cx="8825657" cy="566738"/>
+            <a:off x="866443" y="4800587"/>
+            <a:ext cx="6620967" cy="566738"/>
           </a:xfrm>
         </p:spPr>
         <p:txBody>
@@ -1104,8 +1114,8 @@
         </p:nvSpPr>
         <p:spPr>
           <a:xfrm>
-            <a:off x="1154955" y="685800"/>
-            <a:ext cx="8825658" cy="3640666"/>
+            <a:off x="866442" y="685800"/>
+            <a:ext cx="6620968" cy="3640666"/>
           </a:xfrm>
           <a:prstGeom prst="roundRect">
             <a:avLst>
@@ -1183,8 +1193,8 @@
         </p:nvSpPr>
         <p:spPr>
           <a:xfrm>
-            <a:off x="1154956" y="5367325"/>
-            <a:ext cx="8825656" cy="493712"/>
+            <a:off x="866443" y="5367325"/>
+            <a:ext cx="6620966" cy="493712"/>
           </a:xfrm>
         </p:spPr>
         <p:txBody>
@@ -1306,7 +1316,7 @@
     </p:spTree>
     <p:extLst>
       <p:ext uri="{BB962C8B-B14F-4D97-AF65-F5344CB8AC3E}">
-        <p14:creationId xmlns:p14="http://schemas.microsoft.com/office/powerpoint/2010/main" val="3876701011"/>
+        <p14:creationId xmlns:p14="http://schemas.microsoft.com/office/powerpoint/2010/main" val="3546384888"/>
       </p:ext>
     </p:extLst>
   </p:cSld>
@@ -1345,8 +1355,8 @@
         </p:nvSpPr>
         <p:spPr>
           <a:xfrm>
-            <a:off x="1154954" y="1447800"/>
-            <a:ext cx="8825659" cy="1981200"/>
+            <a:off x="866442" y="1447800"/>
+            <a:ext cx="6620968" cy="1981200"/>
           </a:xfrm>
         </p:spPr>
         <p:txBody>
@@ -1377,8 +1387,8 @@
         </p:nvSpPr>
         <p:spPr>
           <a:xfrm>
-            <a:off x="1154954" y="3657600"/>
-            <a:ext cx="8825659" cy="2362200"/>
+            <a:off x="866442" y="3657600"/>
+            <a:ext cx="6620968" cy="2362200"/>
           </a:xfrm>
         </p:spPr>
         <p:txBody>
@@ -1500,7 +1510,7 @@
     </p:spTree>
     <p:extLst>
       <p:ext uri="{BB962C8B-B14F-4D97-AF65-F5344CB8AC3E}">
-        <p14:creationId xmlns:p14="http://schemas.microsoft.com/office/powerpoint/2010/main" val="3124866995"/>
+        <p14:creationId xmlns:p14="http://schemas.microsoft.com/office/powerpoint/2010/main" val="4216269543"/>
       </p:ext>
     </p:extLst>
   </p:cSld>
@@ -1539,8 +1549,8 @@
         </p:nvSpPr>
         <p:spPr>
           <a:xfrm>
-            <a:off x="1574801" y="1447800"/>
-            <a:ext cx="7999315" cy="2323374"/>
+            <a:off x="1181409" y="1447800"/>
+            <a:ext cx="6001049" cy="2323374"/>
           </a:xfrm>
         </p:spPr>
         <p:txBody>
@@ -1571,8 +1581,8 @@
         </p:nvSpPr>
         <p:spPr>
           <a:xfrm>
-            <a:off x="1930400" y="3771174"/>
-            <a:ext cx="7279649" cy="342174"/>
+            <a:off x="1448177" y="3771174"/>
+            <a:ext cx="5461159" cy="342174"/>
           </a:xfrm>
         </p:spPr>
         <p:txBody>
@@ -1650,8 +1660,8 @@
         </p:nvSpPr>
         <p:spPr>
           <a:xfrm>
-            <a:off x="1154954" y="4350657"/>
-            <a:ext cx="8825659" cy="1676400"/>
+            <a:off x="866442" y="4350657"/>
+            <a:ext cx="6620968" cy="1676400"/>
           </a:xfrm>
         </p:spPr>
         <p:txBody>
@@ -1778,8 +1788,8 @@
         </p:nvSpPr>
         <p:spPr>
           <a:xfrm>
-            <a:off x="898295" y="971253"/>
-            <a:ext cx="801912" cy="1969770"/>
+            <a:off x="673897" y="971253"/>
+            <a:ext cx="601591" cy="1969770"/>
           </a:xfrm>
           <a:prstGeom prst="rect">
             <a:avLst/>
@@ -1811,7 +1821,7 @@
           <a:p>
             <a:pPr lvl="0"/>
             <a:r>
-              <a:rPr lang="en-US" dirty="0"/>
+              <a:rPr lang="en-US" sz="12200" dirty="0"/>
               <a:t>“</a:t>
             </a:r>
           </a:p>
@@ -1825,8 +1835,8 @@
         </p:nvSpPr>
         <p:spPr>
           <a:xfrm>
-            <a:off x="9330490" y="2613787"/>
-            <a:ext cx="801912" cy="1969770"/>
+            <a:off x="6999690" y="2613787"/>
+            <a:ext cx="601591" cy="1969770"/>
           </a:xfrm>
           <a:prstGeom prst="rect">
             <a:avLst/>
@@ -1858,7 +1868,7 @@
           <a:p>
             <a:pPr lvl="0"/>
             <a:r>
-              <a:rPr lang="en-US" dirty="0"/>
+              <a:rPr lang="en-US" sz="12200" dirty="0"/>
               <a:t>”</a:t>
             </a:r>
           </a:p>
@@ -1867,7 +1877,7 @@
     </p:spTree>
     <p:extLst>
       <p:ext uri="{BB962C8B-B14F-4D97-AF65-F5344CB8AC3E}">
-        <p14:creationId xmlns:p14="http://schemas.microsoft.com/office/powerpoint/2010/main" val="498535221"/>
+        <p14:creationId xmlns:p14="http://schemas.microsoft.com/office/powerpoint/2010/main" val="1187071215"/>
       </p:ext>
     </p:extLst>
   </p:cSld>
@@ -1906,8 +1916,8 @@
         </p:nvSpPr>
         <p:spPr>
           <a:xfrm>
-            <a:off x="1154954" y="3124201"/>
-            <a:ext cx="8825660" cy="1653180"/>
+            <a:off x="866441" y="3124201"/>
+            <a:ext cx="6620969" cy="1653180"/>
           </a:xfrm>
         </p:spPr>
         <p:txBody>
@@ -1938,8 +1948,8 @@
         </p:nvSpPr>
         <p:spPr>
           <a:xfrm>
-            <a:off x="1154954" y="4777381"/>
-            <a:ext cx="8825659" cy="860400"/>
+            <a:off x="866442" y="4777381"/>
+            <a:ext cx="6620968" cy="860400"/>
           </a:xfrm>
         </p:spPr>
         <p:txBody>
@@ -2114,7 +2124,7 @@
     </p:spTree>
     <p:extLst>
       <p:ext uri="{BB962C8B-B14F-4D97-AF65-F5344CB8AC3E}">
-        <p14:creationId xmlns:p14="http://schemas.microsoft.com/office/powerpoint/2010/main" val="2585505152"/>
+        <p14:creationId xmlns:p14="http://schemas.microsoft.com/office/powerpoint/2010/main" val="1740769384"/>
       </p:ext>
     </p:extLst>
   </p:cSld>
@@ -2180,8 +2190,8 @@
         </p:nvSpPr>
         <p:spPr>
           <a:xfrm>
-            <a:off x="632947" y="1981200"/>
-            <a:ext cx="2946866" cy="576262"/>
+            <a:off x="474834" y="1981200"/>
+            <a:ext cx="2210725" cy="576262"/>
           </a:xfrm>
         </p:spPr>
         <p:txBody>
@@ -2254,8 +2264,8 @@
         </p:nvSpPr>
         <p:spPr>
           <a:xfrm>
-            <a:off x="652463" y="2667000"/>
-            <a:ext cx="2927350" cy="3589338"/>
+            <a:off x="489475" y="2667000"/>
+            <a:ext cx="2196084" cy="3589338"/>
           </a:xfrm>
         </p:spPr>
         <p:txBody>
@@ -2321,8 +2331,8 @@
         </p:nvSpPr>
         <p:spPr>
           <a:xfrm>
-            <a:off x="3883659" y="1981200"/>
-            <a:ext cx="2936241" cy="576262"/>
+            <a:off x="2913504" y="1981200"/>
+            <a:ext cx="2202754" cy="576262"/>
           </a:xfrm>
         </p:spPr>
         <p:txBody>
@@ -2395,8 +2405,8 @@
         </p:nvSpPr>
         <p:spPr>
           <a:xfrm>
-            <a:off x="3873106" y="2667000"/>
-            <a:ext cx="2946794" cy="3589338"/>
+            <a:off x="2905586" y="2667000"/>
+            <a:ext cx="2210671" cy="3589338"/>
           </a:xfrm>
         </p:spPr>
         <p:txBody>
@@ -2462,8 +2472,8 @@
         </p:nvSpPr>
         <p:spPr>
           <a:xfrm>
-            <a:off x="7124700" y="1981200"/>
-            <a:ext cx="2932113" cy="576262"/>
+            <a:off x="5344917" y="1981200"/>
+            <a:ext cx="2199658" cy="576262"/>
           </a:xfrm>
         </p:spPr>
         <p:txBody>
@@ -2536,8 +2546,8 @@
         </p:nvSpPr>
         <p:spPr>
           <a:xfrm>
-            <a:off x="7124700" y="2667000"/>
-            <a:ext cx="2932113" cy="3589338"/>
+            <a:off x="5344917" y="2667000"/>
+            <a:ext cx="2199658" cy="3589338"/>
           </a:xfrm>
         </p:spPr>
         <p:txBody>
@@ -2599,7 +2609,7 @@
         </p:nvCxnSpPr>
         <p:spPr>
           <a:xfrm>
-            <a:off x="3726142" y="2133600"/>
+            <a:off x="2795334" y="2133600"/>
             <a:ext cx="0" cy="3962400"/>
           </a:xfrm>
           <a:prstGeom prst="line">
@@ -2638,7 +2648,7 @@
         </p:nvCxnSpPr>
         <p:spPr>
           <a:xfrm>
-            <a:off x="6962227" y="2133600"/>
+            <a:off x="5223030" y="2133600"/>
             <a:ext cx="0" cy="3966882"/>
           </a:xfrm>
           <a:prstGeom prst="line">
@@ -2737,7 +2747,7 @@
     </p:spTree>
     <p:extLst>
       <p:ext uri="{BB962C8B-B14F-4D97-AF65-F5344CB8AC3E}">
-        <p14:creationId xmlns:p14="http://schemas.microsoft.com/office/powerpoint/2010/main" val="1294458299"/>
+        <p14:creationId xmlns:p14="http://schemas.microsoft.com/office/powerpoint/2010/main" val="649669346"/>
       </p:ext>
     </p:extLst>
   </p:cSld>
@@ -2803,8 +2813,8 @@
         </p:nvSpPr>
         <p:spPr>
           <a:xfrm>
-            <a:off x="652463" y="4250949"/>
-            <a:ext cx="2940050" cy="576262"/>
+            <a:off x="489475" y="4250949"/>
+            <a:ext cx="2205612" cy="576262"/>
           </a:xfrm>
         </p:spPr>
         <p:txBody>
@@ -2877,8 +2887,8 @@
         </p:nvSpPr>
         <p:spPr>
           <a:xfrm>
-            <a:off x="652463" y="2209800"/>
-            <a:ext cx="2940050" cy="1524000"/>
+            <a:off x="489475" y="2209800"/>
+            <a:ext cx="2205612" cy="1524000"/>
           </a:xfrm>
           <a:prstGeom prst="roundRect">
             <a:avLst>
@@ -2956,8 +2966,8 @@
         </p:nvSpPr>
         <p:spPr>
           <a:xfrm>
-            <a:off x="652463" y="4827211"/>
-            <a:ext cx="2940050" cy="659189"/>
+            <a:off x="489475" y="4827212"/>
+            <a:ext cx="2205612" cy="659189"/>
           </a:xfrm>
         </p:spPr>
         <p:txBody>
@@ -3023,8 +3033,8 @@
         </p:nvSpPr>
         <p:spPr>
           <a:xfrm>
-            <a:off x="3889375" y="4250949"/>
-            <a:ext cx="2930525" cy="576262"/>
+            <a:off x="2917792" y="4250949"/>
+            <a:ext cx="2198466" cy="576262"/>
           </a:xfrm>
         </p:spPr>
         <p:txBody>
@@ -3097,8 +3107,8 @@
         </p:nvSpPr>
         <p:spPr>
           <a:xfrm>
-            <a:off x="3889374" y="2209800"/>
-            <a:ext cx="2930525" cy="1524000"/>
+            <a:off x="2917791" y="2209800"/>
+            <a:ext cx="2198466" cy="1524000"/>
           </a:xfrm>
           <a:prstGeom prst="roundRect">
             <a:avLst>
@@ -3176,8 +3186,8 @@
         </p:nvSpPr>
         <p:spPr>
           <a:xfrm>
-            <a:off x="3888022" y="4827210"/>
-            <a:ext cx="2934406" cy="659189"/>
+            <a:off x="2916776" y="4827211"/>
+            <a:ext cx="2201378" cy="659189"/>
           </a:xfrm>
         </p:spPr>
         <p:txBody>
@@ -3243,8 +3253,8 @@
         </p:nvSpPr>
         <p:spPr>
           <a:xfrm>
-            <a:off x="7124700" y="4250949"/>
-            <a:ext cx="2932113" cy="576262"/>
+            <a:off x="5344917" y="4250949"/>
+            <a:ext cx="2199658" cy="576262"/>
           </a:xfrm>
         </p:spPr>
         <p:txBody>
@@ -3317,8 +3327,8 @@
         </p:nvSpPr>
         <p:spPr>
           <a:xfrm>
-            <a:off x="7124699" y="2209800"/>
-            <a:ext cx="2932113" cy="1524000"/>
+            <a:off x="5344916" y="2209800"/>
+            <a:ext cx="2199658" cy="1524000"/>
           </a:xfrm>
           <a:prstGeom prst="roundRect">
             <a:avLst>
@@ -3396,8 +3406,8 @@
         </p:nvSpPr>
         <p:spPr>
           <a:xfrm>
-            <a:off x="7124575" y="4827208"/>
-            <a:ext cx="2935997" cy="659189"/>
+            <a:off x="5344824" y="4827209"/>
+            <a:ext cx="2202571" cy="659189"/>
           </a:xfrm>
         </p:spPr>
         <p:txBody>
@@ -3459,7 +3469,7 @@
         </p:nvCxnSpPr>
         <p:spPr>
           <a:xfrm>
-            <a:off x="3726142" y="2133600"/>
+            <a:off x="2795334" y="2133600"/>
             <a:ext cx="0" cy="3962400"/>
           </a:xfrm>
           <a:prstGeom prst="line">
@@ -3498,7 +3508,7 @@
         </p:nvCxnSpPr>
         <p:spPr>
           <a:xfrm>
-            <a:off x="6962227" y="2133600"/>
+            <a:off x="5223030" y="2133600"/>
             <a:ext cx="0" cy="3966882"/>
           </a:xfrm>
           <a:prstGeom prst="line">
@@ -3597,7 +3607,7 @@
     </p:spTree>
     <p:extLst>
       <p:ext uri="{BB962C8B-B14F-4D97-AF65-F5344CB8AC3E}">
-        <p14:creationId xmlns:p14="http://schemas.microsoft.com/office/powerpoint/2010/main" val="2801044666"/>
+        <p14:creationId xmlns:p14="http://schemas.microsoft.com/office/powerpoint/2010/main" val="1388753751"/>
       </p:ext>
     </p:extLst>
   </p:cSld>
@@ -3767,7 +3777,7 @@
     </p:spTree>
     <p:extLst>
       <p:ext uri="{BB962C8B-B14F-4D97-AF65-F5344CB8AC3E}">
-        <p14:creationId xmlns:p14="http://schemas.microsoft.com/office/powerpoint/2010/main" val="2706662767"/>
+        <p14:creationId xmlns:p14="http://schemas.microsoft.com/office/powerpoint/2010/main" val="2471569725"/>
       </p:ext>
     </p:extLst>
   </p:cSld>
@@ -3806,8 +3816,8 @@
         </p:nvSpPr>
         <p:spPr>
           <a:xfrm>
-            <a:off x="8304212" y="430213"/>
-            <a:ext cx="1752601" cy="5826125"/>
+            <a:off x="6229782" y="430214"/>
+            <a:ext cx="1314793" cy="5826125"/>
           </a:xfrm>
         </p:spPr>
         <p:txBody>
@@ -3834,8 +3844,8 @@
         </p:nvSpPr>
         <p:spPr>
           <a:xfrm>
-            <a:off x="652463" y="887414"/>
-            <a:ext cx="7423149" cy="5368924"/>
+            <a:off x="489475" y="773205"/>
+            <a:ext cx="5568812" cy="5483134"/>
           </a:xfrm>
         </p:spPr>
         <p:txBody>
@@ -3947,7 +3957,7 @@
     </p:spTree>
     <p:extLst>
       <p:ext uri="{BB962C8B-B14F-4D97-AF65-F5344CB8AC3E}">
-        <p14:creationId xmlns:p14="http://schemas.microsoft.com/office/powerpoint/2010/main" val="2229726876"/>
+        <p14:creationId xmlns:p14="http://schemas.microsoft.com/office/powerpoint/2010/main" val="586556606"/>
       </p:ext>
     </p:extLst>
   </p:cSld>
@@ -4117,7 +4127,7 @@
     </p:spTree>
     <p:extLst>
       <p:ext uri="{BB962C8B-B14F-4D97-AF65-F5344CB8AC3E}">
-        <p14:creationId xmlns:p14="http://schemas.microsoft.com/office/powerpoint/2010/main" val="2232173798"/>
+        <p14:creationId xmlns:p14="http://schemas.microsoft.com/office/powerpoint/2010/main" val="3480311134"/>
       </p:ext>
     </p:extLst>
   </p:cSld>
@@ -4156,8 +4166,8 @@
         </p:nvSpPr>
         <p:spPr>
           <a:xfrm>
-            <a:off x="1154956" y="2861733"/>
-            <a:ext cx="8825657" cy="1915647"/>
+            <a:off x="866443" y="2861734"/>
+            <a:ext cx="6620967" cy="1915647"/>
           </a:xfrm>
         </p:spPr>
         <p:txBody>
@@ -4188,8 +4198,8 @@
         </p:nvSpPr>
         <p:spPr>
           <a:xfrm>
-            <a:off x="1154955" y="4777381"/>
-            <a:ext cx="8825658" cy="860400"/>
+            <a:off x="866442" y="4777381"/>
+            <a:ext cx="6620968" cy="860400"/>
           </a:xfrm>
         </p:spPr>
         <p:txBody>
@@ -4364,7 +4374,7 @@
     </p:spTree>
     <p:extLst>
       <p:ext uri="{BB962C8B-B14F-4D97-AF65-F5344CB8AC3E}">
-        <p14:creationId xmlns:p14="http://schemas.microsoft.com/office/powerpoint/2010/main" val="1370442032"/>
+        <p14:creationId xmlns:p14="http://schemas.microsoft.com/office/powerpoint/2010/main" val="3281517619"/>
       </p:ext>
     </p:extLst>
   </p:cSld>
@@ -4426,8 +4436,8 @@
         </p:nvSpPr>
         <p:spPr>
           <a:xfrm>
-            <a:off x="1103312" y="2060575"/>
-            <a:ext cx="4396339" cy="4195763"/>
+            <a:off x="827700" y="2060576"/>
+            <a:ext cx="3298113" cy="4195763"/>
           </a:xfrm>
         </p:spPr>
         <p:txBody>
@@ -4513,8 +4523,8 @@
         </p:nvSpPr>
         <p:spPr>
           <a:xfrm>
-            <a:off x="5654493" y="2056092"/>
-            <a:ext cx="4396341" cy="4200245"/>
+            <a:off x="4241975" y="2056093"/>
+            <a:ext cx="3298115" cy="4200245"/>
           </a:xfrm>
         </p:spPr>
         <p:txBody>
@@ -4656,7 +4666,7 @@
     </p:spTree>
     <p:extLst>
       <p:ext uri="{BB962C8B-B14F-4D97-AF65-F5344CB8AC3E}">
-        <p14:creationId xmlns:p14="http://schemas.microsoft.com/office/powerpoint/2010/main" val="415678197"/>
+        <p14:creationId xmlns:p14="http://schemas.microsoft.com/office/powerpoint/2010/main" val="1854162368"/>
       </p:ext>
     </p:extLst>
   </p:cSld>
@@ -4722,8 +4732,8 @@
         </p:nvSpPr>
         <p:spPr>
           <a:xfrm>
-            <a:off x="1103313" y="1905000"/>
-            <a:ext cx="4396338" cy="576262"/>
+            <a:off x="827700" y="1905000"/>
+            <a:ext cx="3298112" cy="576262"/>
           </a:xfrm>
         </p:spPr>
         <p:txBody>
@@ -4796,8 +4806,8 @@
         </p:nvSpPr>
         <p:spPr>
           <a:xfrm>
-            <a:off x="1103312" y="2514600"/>
-            <a:ext cx="4396339" cy="3741738"/>
+            <a:off x="827700" y="2514600"/>
+            <a:ext cx="3298113" cy="3741738"/>
           </a:xfrm>
         </p:spPr>
         <p:txBody>
@@ -4883,8 +4893,8 @@
         </p:nvSpPr>
         <p:spPr>
           <a:xfrm>
-            <a:off x="5654495" y="1905000"/>
-            <a:ext cx="4396339" cy="576262"/>
+            <a:off x="4241976" y="1905000"/>
+            <a:ext cx="3298113" cy="576262"/>
           </a:xfrm>
         </p:spPr>
         <p:txBody>
@@ -4957,8 +4967,8 @@
         </p:nvSpPr>
         <p:spPr>
           <a:xfrm>
-            <a:off x="5654495" y="2514600"/>
-            <a:ext cx="4396339" cy="3741738"/>
+            <a:off x="4241976" y="2514600"/>
+            <a:ext cx="3298113" cy="3741738"/>
           </a:xfrm>
         </p:spPr>
         <p:txBody>
@@ -5100,7 +5110,7 @@
     </p:spTree>
     <p:extLst>
       <p:ext uri="{BB962C8B-B14F-4D97-AF65-F5344CB8AC3E}">
-        <p14:creationId xmlns:p14="http://schemas.microsoft.com/office/powerpoint/2010/main" val="3592091833"/>
+        <p14:creationId xmlns:p14="http://schemas.microsoft.com/office/powerpoint/2010/main" val="2675432875"/>
       </p:ext>
     </p:extLst>
   </p:cSld>
@@ -5218,7 +5228,7 @@
     </p:spTree>
     <p:extLst>
       <p:ext uri="{BB962C8B-B14F-4D97-AF65-F5344CB8AC3E}">
-        <p14:creationId xmlns:p14="http://schemas.microsoft.com/office/powerpoint/2010/main" val="4224154223"/>
+        <p14:creationId xmlns:p14="http://schemas.microsoft.com/office/powerpoint/2010/main" val="2168182034"/>
       </p:ext>
     </p:extLst>
   </p:cSld>
@@ -5313,7 +5323,7 @@
     </p:spTree>
     <p:extLst>
       <p:ext uri="{BB962C8B-B14F-4D97-AF65-F5344CB8AC3E}">
-        <p14:creationId xmlns:p14="http://schemas.microsoft.com/office/powerpoint/2010/main" val="586989206"/>
+        <p14:creationId xmlns:p14="http://schemas.microsoft.com/office/powerpoint/2010/main" val="1208322200"/>
       </p:ext>
     </p:extLst>
   </p:cSld>
@@ -5352,8 +5362,8 @@
         </p:nvSpPr>
         <p:spPr>
           <a:xfrm>
-            <a:off x="1154953" y="1447800"/>
-            <a:ext cx="3401064" cy="1447800"/>
+            <a:off x="866441" y="1447800"/>
+            <a:ext cx="2551462" cy="1447800"/>
           </a:xfrm>
         </p:spPr>
         <p:txBody>
@@ -5384,8 +5394,8 @@
         </p:nvSpPr>
         <p:spPr>
           <a:xfrm>
-            <a:off x="4784616" y="1447800"/>
-            <a:ext cx="5195997" cy="4572000"/>
+            <a:off x="3589397" y="1447800"/>
+            <a:ext cx="3898013" cy="4572000"/>
           </a:xfrm>
         </p:spPr>
         <p:txBody>
@@ -5471,8 +5481,8 @@
         </p:nvSpPr>
         <p:spPr>
           <a:xfrm>
-            <a:off x="1154953" y="3129280"/>
-            <a:ext cx="3401063" cy="2895599"/>
+            <a:off x="866441" y="3129281"/>
+            <a:ext cx="2551462" cy="2895599"/>
           </a:xfrm>
         </p:spPr>
         <p:txBody>
@@ -5592,7 +5602,7 @@
     </p:spTree>
     <p:extLst>
       <p:ext uri="{BB962C8B-B14F-4D97-AF65-F5344CB8AC3E}">
-        <p14:creationId xmlns:p14="http://schemas.microsoft.com/office/powerpoint/2010/main" val="2310221695"/>
+        <p14:creationId xmlns:p14="http://schemas.microsoft.com/office/powerpoint/2010/main" val="2404818600"/>
       </p:ext>
     </p:extLst>
   </p:cSld>
@@ -5631,8 +5641,8 @@
         </p:nvSpPr>
         <p:spPr>
           <a:xfrm>
-            <a:off x="1153907" y="1854192"/>
-            <a:ext cx="5092906" cy="1574808"/>
+            <a:off x="865656" y="1854192"/>
+            <a:ext cx="3820674" cy="1574808"/>
           </a:xfrm>
         </p:spPr>
         <p:txBody>
@@ -5665,8 +5675,8 @@
         </p:nvSpPr>
         <p:spPr>
           <a:xfrm>
-            <a:off x="6949546" y="1143000"/>
-            <a:ext cx="3200400" cy="4572000"/>
+            <a:off x="5213517" y="1143000"/>
+            <a:ext cx="2400925" cy="4572000"/>
           </a:xfrm>
           <a:prstGeom prst="roundRect">
             <a:avLst>
@@ -5744,8 +5754,8 @@
         </p:nvSpPr>
         <p:spPr>
           <a:xfrm>
-            <a:off x="1154954" y="3657600"/>
-            <a:ext cx="5084979" cy="1371600"/>
+            <a:off x="866441" y="3657600"/>
+            <a:ext cx="3814728" cy="1371600"/>
           </a:xfrm>
         </p:spPr>
         <p:txBody>
@@ -5867,7 +5877,7 @@
     </p:spTree>
     <p:extLst>
       <p:ext uri="{BB962C8B-B14F-4D97-AF65-F5344CB8AC3E}">
-        <p14:creationId xmlns:p14="http://schemas.microsoft.com/office/powerpoint/2010/main" val="3817213364"/>
+        <p14:creationId xmlns:p14="http://schemas.microsoft.com/office/powerpoint/2010/main" val="1047271755"/>
       </p:ext>
     </p:extLst>
   </p:cSld>
@@ -5899,73 +5909,15 @@
           <a:chExt cx="0" cy="0"/>
         </a:xfrm>
       </p:grpSpPr>
-      <p:pic>
-        <p:nvPicPr>
-          <p:cNvPr id="8" name="Picture 7"/>
-          <p:cNvPicPr>
-            <a:picLocks noChangeAspect="1"/>
-          </p:cNvPicPr>
+      <p:sp>
+        <p:nvSpPr>
+          <p:cNvPr id="22" name="Oval 21"/>
+          <p:cNvSpPr/>
           <p:nvPr/>
-        </p:nvPicPr>
-        <p:blipFill rotWithShape="1">
-          <a:blip r:embed="rId19">
-            <a:extLst>
-              <a:ext uri="{28A0092B-C50C-407E-A947-70E740481C1C}">
-                <a14:useLocalDpi xmlns:a14="http://schemas.microsoft.com/office/drawing/2010/main" val="0"/>
-              </a:ext>
-            </a:extLst>
-          </a:blip>
-          <a:srcRect l="3613"/>
-          <a:stretch/>
-        </p:blipFill>
+        </p:nvSpPr>
         <p:spPr>
           <a:xfrm>
-            <a:off x="0" y="2669685"/>
-            <a:ext cx="4037012" cy="4188315"/>
-          </a:xfrm>
-          <a:prstGeom prst="rect">
-            <a:avLst/>
-          </a:prstGeom>
-        </p:spPr>
-      </p:pic>
-      <p:pic>
-        <p:nvPicPr>
-          <p:cNvPr id="7" name="Picture 6"/>
-          <p:cNvPicPr>
-            <a:picLocks noChangeAspect="1"/>
-          </p:cNvPicPr>
-          <p:nvPr/>
-        </p:nvPicPr>
-        <p:blipFill rotWithShape="1">
-          <a:blip r:embed="rId20">
-            <a:extLst>
-              <a:ext uri="{28A0092B-C50C-407E-A947-70E740481C1C}">
-                <a14:useLocalDpi xmlns:a14="http://schemas.microsoft.com/office/drawing/2010/main" val="0"/>
-              </a:ext>
-            </a:extLst>
-          </a:blip>
-          <a:srcRect l="35640"/>
-          <a:stretch/>
-        </p:blipFill>
-        <p:spPr>
-          <a:xfrm>
-            <a:off x="0" y="2892347"/>
-            <a:ext cx="1522412" cy="2365453"/>
-          </a:xfrm>
-          <a:prstGeom prst="rect">
-            <a:avLst/>
-          </a:prstGeom>
-        </p:spPr>
-      </p:pic>
-      <p:sp>
-        <p:nvSpPr>
-          <p:cNvPr id="16" name="Oval 15"/>
-          <p:cNvSpPr/>
-          <p:nvPr/>
-        </p:nvSpPr>
-        <p:spPr>
-          <a:xfrm>
-            <a:off x="8609012" y="1676400"/>
+            <a:off x="6299432" y="1676400"/>
             <a:ext cx="2819400" cy="2819400"/>
           </a:xfrm>
           <a:prstGeom prst="ellipse">
@@ -6020,64 +5972,258 @@
           </a:fontRef>
         </p:style>
       </p:sp>
-      <p:pic>
-        <p:nvPicPr>
-          <p:cNvPr id="9" name="Picture 8"/>
-          <p:cNvPicPr>
-            <a:picLocks noChangeAspect="1"/>
-          </p:cNvPicPr>
+      <p:sp>
+        <p:nvSpPr>
+          <p:cNvPr id="23" name="Oval 22"/>
+          <p:cNvSpPr/>
           <p:nvPr/>
-        </p:nvPicPr>
-        <p:blipFill rotWithShape="1">
-          <a:blip r:embed="rId21">
-            <a:extLst>
-              <a:ext uri="{28A0092B-C50C-407E-A947-70E740481C1C}">
-                <a14:useLocalDpi xmlns:a14="http://schemas.microsoft.com/office/drawing/2010/main" val="0"/>
-              </a:ext>
-            </a:extLst>
-          </a:blip>
-          <a:srcRect t="28813"/>
-          <a:stretch/>
-        </p:blipFill>
+        </p:nvSpPr>
         <p:spPr>
           <a:xfrm>
-            <a:off x="7999412" y="0"/>
-            <a:ext cx="1603387" cy="1141407"/>
+            <a:off x="5689832" y="-457200"/>
+            <a:ext cx="1600200" cy="1600200"/>
           </a:xfrm>
-          <a:prstGeom prst="rect">
+          <a:prstGeom prst="ellipse">
             <a:avLst/>
           </a:prstGeom>
+          <a:gradFill flip="none" rotWithShape="1">
+            <a:gsLst>
+              <a:gs pos="0">
+                <a:schemeClr val="bg2">
+                  <a:lumMod val="60000"/>
+                  <a:lumOff val="40000"/>
+                  <a:alpha val="14000"/>
+                </a:schemeClr>
+              </a:gs>
+              <a:gs pos="73000">
+                <a:schemeClr val="bg2">
+                  <a:lumMod val="60000"/>
+                  <a:lumOff val="40000"/>
+                  <a:alpha val="0"/>
+                </a:schemeClr>
+              </a:gs>
+              <a:gs pos="36000">
+                <a:schemeClr val="bg2">
+                  <a:lumMod val="60000"/>
+                  <a:lumOff val="40000"/>
+                  <a:alpha val="7000"/>
+                </a:schemeClr>
+              </a:gs>
+            </a:gsLst>
+            <a:path path="circle">
+              <a:fillToRect l="50000" t="50000" r="50000" b="50000"/>
+            </a:path>
+            <a:tileRect/>
+          </a:gradFill>
+          <a:ln>
+            <a:noFill/>
+          </a:ln>
+          <a:effectLst/>
         </p:spPr>
-      </p:pic>
-      <p:pic>
-        <p:nvPicPr>
-          <p:cNvPr id="10" name="Picture 9"/>
-          <p:cNvPicPr>
-            <a:picLocks noChangeAspect="1"/>
-          </p:cNvPicPr>
+        <p:style>
+          <a:lnRef idx="1">
+            <a:schemeClr val="accent1"/>
+          </a:lnRef>
+          <a:fillRef idx="3">
+            <a:schemeClr val="accent1"/>
+          </a:fillRef>
+          <a:effectRef idx="2">
+            <a:schemeClr val="accent1"/>
+          </a:effectRef>
+          <a:fontRef idx="minor">
+            <a:schemeClr val="lt1"/>
+          </a:fontRef>
+        </p:style>
+      </p:sp>
+      <p:sp>
+        <p:nvSpPr>
+          <p:cNvPr id="24" name="Oval 23"/>
+          <p:cNvSpPr/>
           <p:nvPr/>
-        </p:nvPicPr>
-        <p:blipFill rotWithShape="1">
-          <a:blip r:embed="rId22">
-            <a:extLst>
-              <a:ext uri="{28A0092B-C50C-407E-A947-70E740481C1C}">
-                <a14:useLocalDpi xmlns:a14="http://schemas.microsoft.com/office/drawing/2010/main" val="0"/>
-              </a:ext>
-            </a:extLst>
-          </a:blip>
-          <a:srcRect b="23320"/>
-          <a:stretch/>
-        </p:blipFill>
+        </p:nvSpPr>
         <p:spPr>
           <a:xfrm>
-            <a:off x="8605878" y="6096000"/>
-            <a:ext cx="993734" cy="762000"/>
+            <a:off x="6299432" y="6096000"/>
+            <a:ext cx="990600" cy="990600"/>
           </a:xfrm>
-          <a:prstGeom prst="rect">
+          <a:prstGeom prst="ellipse">
             <a:avLst/>
           </a:prstGeom>
+          <a:gradFill flip="none" rotWithShape="1">
+            <a:gsLst>
+              <a:gs pos="0">
+                <a:schemeClr val="bg2">
+                  <a:lumMod val="60000"/>
+                  <a:lumOff val="40000"/>
+                  <a:alpha val="9000"/>
+                </a:schemeClr>
+              </a:gs>
+              <a:gs pos="66000">
+                <a:schemeClr val="bg2">
+                  <a:lumMod val="60000"/>
+                  <a:lumOff val="40000"/>
+                  <a:alpha val="0"/>
+                </a:schemeClr>
+              </a:gs>
+              <a:gs pos="36000">
+                <a:schemeClr val="bg2">
+                  <a:lumMod val="60000"/>
+                  <a:lumOff val="40000"/>
+                  <a:alpha val="5000"/>
+                </a:schemeClr>
+              </a:gs>
+            </a:gsLst>
+            <a:path path="circle">
+              <a:fillToRect l="50000" t="50000" r="50000" b="50000"/>
+            </a:path>
+            <a:tileRect/>
+          </a:gradFill>
+          <a:ln>
+            <a:noFill/>
+          </a:ln>
+          <a:effectLst/>
         </p:spPr>
-      </p:pic>
+        <p:style>
+          <a:lnRef idx="1">
+            <a:schemeClr val="accent1"/>
+          </a:lnRef>
+          <a:fillRef idx="3">
+            <a:schemeClr val="accent1"/>
+          </a:fillRef>
+          <a:effectRef idx="2">
+            <a:schemeClr val="accent1"/>
+          </a:effectRef>
+          <a:fontRef idx="minor">
+            <a:schemeClr val="lt1"/>
+          </a:fontRef>
+        </p:style>
+      </p:sp>
+      <p:sp>
+        <p:nvSpPr>
+          <p:cNvPr id="20" name="Oval 19"/>
+          <p:cNvSpPr/>
+          <p:nvPr/>
+        </p:nvSpPr>
+        <p:spPr>
+          <a:xfrm>
+            <a:off x="-153988" y="2667000"/>
+            <a:ext cx="4191000" cy="4191000"/>
+          </a:xfrm>
+          <a:prstGeom prst="ellipse">
+            <a:avLst/>
+          </a:prstGeom>
+          <a:gradFill flip="none" rotWithShape="1">
+            <a:gsLst>
+              <a:gs pos="0">
+                <a:schemeClr val="bg2">
+                  <a:lumMod val="60000"/>
+                  <a:lumOff val="40000"/>
+                  <a:alpha val="11000"/>
+                </a:schemeClr>
+              </a:gs>
+              <a:gs pos="75000">
+                <a:schemeClr val="bg2">
+                  <a:lumMod val="60000"/>
+                  <a:lumOff val="40000"/>
+                  <a:alpha val="0"/>
+                </a:schemeClr>
+              </a:gs>
+              <a:gs pos="36000">
+                <a:schemeClr val="bg2">
+                  <a:lumMod val="60000"/>
+                  <a:lumOff val="40000"/>
+                  <a:alpha val="10000"/>
+                </a:schemeClr>
+              </a:gs>
+            </a:gsLst>
+            <a:path path="circle">
+              <a:fillToRect l="50000" t="50000" r="50000" b="50000"/>
+            </a:path>
+            <a:tileRect/>
+          </a:gradFill>
+          <a:ln>
+            <a:noFill/>
+          </a:ln>
+          <a:effectLst/>
+        </p:spPr>
+        <p:style>
+          <a:lnRef idx="1">
+            <a:schemeClr val="accent1"/>
+          </a:lnRef>
+          <a:fillRef idx="3">
+            <a:schemeClr val="accent1"/>
+          </a:fillRef>
+          <a:effectRef idx="2">
+            <a:schemeClr val="accent1"/>
+          </a:effectRef>
+          <a:fontRef idx="minor">
+            <a:schemeClr val="lt1"/>
+          </a:fontRef>
+        </p:style>
+      </p:sp>
+      <p:sp>
+        <p:nvSpPr>
+          <p:cNvPr id="21" name="Oval 20"/>
+          <p:cNvSpPr/>
+          <p:nvPr/>
+        </p:nvSpPr>
+        <p:spPr>
+          <a:xfrm>
+            <a:off x="-839788" y="2895600"/>
+            <a:ext cx="2362200" cy="2362200"/>
+          </a:xfrm>
+          <a:prstGeom prst="ellipse">
+            <a:avLst/>
+          </a:prstGeom>
+          <a:gradFill flip="none" rotWithShape="1">
+            <a:gsLst>
+              <a:gs pos="0">
+                <a:schemeClr val="bg2">
+                  <a:lumMod val="60000"/>
+                  <a:lumOff val="40000"/>
+                  <a:alpha val="8000"/>
+                </a:schemeClr>
+              </a:gs>
+              <a:gs pos="72000">
+                <a:schemeClr val="bg2">
+                  <a:lumMod val="60000"/>
+                  <a:lumOff val="40000"/>
+                  <a:alpha val="0"/>
+                </a:schemeClr>
+              </a:gs>
+              <a:gs pos="36000">
+                <a:schemeClr val="bg2">
+                  <a:lumMod val="60000"/>
+                  <a:lumOff val="40000"/>
+                  <a:alpha val="8000"/>
+                </a:schemeClr>
+              </a:gs>
+            </a:gsLst>
+            <a:path path="circle">
+              <a:fillToRect l="50000" t="50000" r="50000" b="50000"/>
+            </a:path>
+            <a:tileRect/>
+          </a:gradFill>
+          <a:ln>
+            <a:noFill/>
+          </a:ln>
+          <a:effectLst/>
+        </p:spPr>
+        <p:style>
+          <a:lnRef idx="1">
+            <a:schemeClr val="accent1"/>
+          </a:lnRef>
+          <a:fillRef idx="3">
+            <a:schemeClr val="accent1"/>
+          </a:fillRef>
+          <a:effectRef idx="2">
+            <a:schemeClr val="accent1"/>
+          </a:effectRef>
+          <a:fontRef idx="minor">
+            <a:schemeClr val="lt1"/>
+          </a:fontRef>
+        </p:style>
+      </p:sp>
       <p:sp>
         <p:nvSpPr>
           <p:cNvPr id="2" name="Title Placeholder 1"/>
@@ -6090,8 +6236,8 @@
         </p:nvSpPr>
         <p:spPr>
           <a:xfrm>
-            <a:off x="646111" y="452718"/>
-            <a:ext cx="9404723" cy="1400530"/>
+            <a:off x="484710" y="452718"/>
+            <a:ext cx="7055380" cy="1400530"/>
           </a:xfrm>
           <a:prstGeom prst="rect">
             <a:avLst/>
@@ -6123,8 +6269,8 @@
         </p:nvSpPr>
         <p:spPr>
           <a:xfrm>
-            <a:off x="1103312" y="2052918"/>
-            <a:ext cx="8946541" cy="4195481"/>
+            <a:off x="827700" y="2052925"/>
+            <a:ext cx="6711654" cy="4195481"/>
           </a:xfrm>
           <a:prstGeom prst="rect">
             <a:avLst/>
@@ -6185,8 +6331,8 @@
         </p:nvSpPr>
         <p:spPr>
           <a:xfrm rot="5400000">
-            <a:off x="10155639" y="1790701"/>
-            <a:ext cx="990599" cy="304799"/>
+            <a:off x="7494989" y="1828771"/>
+            <a:ext cx="990599" cy="228659"/>
           </a:xfrm>
           <a:prstGeom prst="rect">
             <a:avLst/>
@@ -6227,8 +6373,8 @@
         </p:nvSpPr>
         <p:spPr>
           <a:xfrm rot="5400000">
-            <a:off x="8951573" y="3225297"/>
-            <a:ext cx="3859795" cy="304801"/>
+            <a:off x="6233335" y="3263371"/>
+            <a:ext cx="3859795" cy="228660"/>
           </a:xfrm>
           <a:prstGeom prst="rect">
             <a:avLst/>
@@ -6265,8 +6411,8 @@
         </p:nvSpPr>
         <p:spPr bwMode="gray">
           <a:xfrm>
-            <a:off x="10352540" y="295729"/>
-            <a:ext cx="838199" cy="767687"/>
+            <a:off x="7766431" y="295736"/>
+            <a:ext cx="628813" cy="767687"/>
           </a:xfrm>
           <a:prstGeom prst="rect">
             <a:avLst/>
@@ -6276,7 +6422,7 @@
           <a:bodyPr vert="horz" lIns="91440" tIns="45720" rIns="91440" bIns="45720" rtlCol="0" anchor="b"/>
           <a:lstStyle>
             <a:lvl1pPr algn="ctr">
-              <a:defRPr sz="2800" b="0" i="0">
+              <a:defRPr sz="2801" b="0" i="0">
                 <a:solidFill>
                   <a:schemeClr val="tx1">
                     <a:tint val="75000"/>
@@ -6297,33 +6443,33 @@
     </p:spTree>
     <p:extLst>
       <p:ext uri="{BB962C8B-B14F-4D97-AF65-F5344CB8AC3E}">
-        <p14:creationId xmlns:p14="http://schemas.microsoft.com/office/powerpoint/2010/main" val="3973013943"/>
+        <p14:creationId xmlns:p14="http://schemas.microsoft.com/office/powerpoint/2010/main" val="3870079818"/>
       </p:ext>
     </p:extLst>
   </p:cSld>
   <p:clrMap bg1="dk1" tx1="lt1" bg2="dk2" tx2="lt2" accent1="accent1" accent2="accent2" accent3="accent3" accent4="accent4" accent5="accent5" accent6="accent6" hlink="hlink" folHlink="folHlink"/>
   <p:sldLayoutIdLst>
-    <p:sldLayoutId id="2147483661" r:id="rId1"/>
-    <p:sldLayoutId id="2147483662" r:id="rId2"/>
-    <p:sldLayoutId id="2147483663" r:id="rId3"/>
-    <p:sldLayoutId id="2147483664" r:id="rId4"/>
-    <p:sldLayoutId id="2147483665" r:id="rId5"/>
-    <p:sldLayoutId id="2147483666" r:id="rId6"/>
-    <p:sldLayoutId id="2147483667" r:id="rId7"/>
-    <p:sldLayoutId id="2147483668" r:id="rId8"/>
-    <p:sldLayoutId id="2147483669" r:id="rId9"/>
-    <p:sldLayoutId id="2147483670" r:id="rId10"/>
-    <p:sldLayoutId id="2147483671" r:id="rId11"/>
-    <p:sldLayoutId id="2147483672" r:id="rId12"/>
-    <p:sldLayoutId id="2147483673" r:id="rId13"/>
-    <p:sldLayoutId id="2147483674" r:id="rId14"/>
-    <p:sldLayoutId id="2147483675" r:id="rId15"/>
-    <p:sldLayoutId id="2147483676" r:id="rId16"/>
-    <p:sldLayoutId id="2147483677" r:id="rId17"/>
+    <p:sldLayoutId id="2147483679" r:id="rId1"/>
+    <p:sldLayoutId id="2147483680" r:id="rId2"/>
+    <p:sldLayoutId id="2147483681" r:id="rId3"/>
+    <p:sldLayoutId id="2147483682" r:id="rId4"/>
+    <p:sldLayoutId id="2147483683" r:id="rId5"/>
+    <p:sldLayoutId id="2147483684" r:id="rId6"/>
+    <p:sldLayoutId id="2147483685" r:id="rId7"/>
+    <p:sldLayoutId id="2147483686" r:id="rId8"/>
+    <p:sldLayoutId id="2147483687" r:id="rId9"/>
+    <p:sldLayoutId id="2147483688" r:id="rId10"/>
+    <p:sldLayoutId id="2147483689" r:id="rId11"/>
+    <p:sldLayoutId id="2147483690" r:id="rId12"/>
+    <p:sldLayoutId id="2147483691" r:id="rId13"/>
+    <p:sldLayoutId id="2147483692" r:id="rId14"/>
+    <p:sldLayoutId id="2147483693" r:id="rId15"/>
+    <p:sldLayoutId id="2147483694" r:id="rId16"/>
+    <p:sldLayoutId id="2147483695" r:id="rId17"/>
   </p:sldLayoutIdLst>
   <p:txStyles>
     <p:titleStyle>
-      <a:lvl1pPr algn="l" defTabSz="457200" rtl="0" eaLnBrk="1" latinLnBrk="0" hangingPunct="1">
+      <a:lvl1pPr algn="l" defTabSz="457207" rtl="0" eaLnBrk="1" latinLnBrk="0" hangingPunct="1">
         <a:spcBef>
           <a:spcPct val="0"/>
         </a:spcBef>
@@ -6395,7 +6541,7 @@
       </a:lvl9pPr>
     </p:titleStyle>
     <p:bodyStyle>
-      <a:lvl1pPr marL="342900" indent="-342900" algn="l" defTabSz="457200" rtl="0" eaLnBrk="1" latinLnBrk="0" hangingPunct="1">
+      <a:lvl1pPr marL="342906" indent="-342906" algn="l" defTabSz="457207" rtl="0" eaLnBrk="1" latinLnBrk="0" hangingPunct="1">
         <a:spcBef>
           <a:spcPts val="1000"/>
         </a:spcBef>
@@ -6420,7 +6566,7 @@
           <a:cs typeface="+mj-cs"/>
         </a:defRPr>
       </a:lvl1pPr>
-      <a:lvl2pPr marL="742950" indent="-285750" algn="l" defTabSz="457200" rtl="0" eaLnBrk="1" latinLnBrk="0" hangingPunct="1">
+      <a:lvl2pPr marL="742962" indent="-285755" algn="l" defTabSz="457207" rtl="0" eaLnBrk="1" latinLnBrk="0" hangingPunct="1">
         <a:spcBef>
           <a:spcPts val="1000"/>
         </a:spcBef>
@@ -6445,7 +6591,7 @@
           <a:cs typeface="+mj-cs"/>
         </a:defRPr>
       </a:lvl2pPr>
-      <a:lvl3pPr marL="1143000" indent="-228600" algn="l" defTabSz="457200" rtl="0" eaLnBrk="1" latinLnBrk="0" hangingPunct="1">
+      <a:lvl3pPr marL="1143020" indent="-228604" algn="l" defTabSz="457207" rtl="0" eaLnBrk="1" latinLnBrk="0" hangingPunct="1">
         <a:spcBef>
           <a:spcPts val="1000"/>
         </a:spcBef>
@@ -6470,7 +6616,7 @@
           <a:cs typeface="+mj-cs"/>
         </a:defRPr>
       </a:lvl3pPr>
-      <a:lvl4pPr marL="1600200" indent="-228600" algn="l" defTabSz="457200" rtl="0" eaLnBrk="1" latinLnBrk="0" hangingPunct="1">
+      <a:lvl4pPr marL="1600227" indent="-228604" algn="l" defTabSz="457207" rtl="0" eaLnBrk="1" latinLnBrk="0" hangingPunct="1">
         <a:spcBef>
           <a:spcPts val="1000"/>
         </a:spcBef>
@@ -6495,7 +6641,7 @@
           <a:cs typeface="+mj-cs"/>
         </a:defRPr>
       </a:lvl4pPr>
-      <a:lvl5pPr marL="2057400" indent="-228600" algn="l" defTabSz="457200" rtl="0" eaLnBrk="1" latinLnBrk="0" hangingPunct="1">
+      <a:lvl5pPr marL="2057434" indent="-228604" algn="l" defTabSz="457207" rtl="0" eaLnBrk="1" latinLnBrk="0" hangingPunct="1">
         <a:spcBef>
           <a:spcPts val="1000"/>
         </a:spcBef>
@@ -6520,7 +6666,7 @@
           <a:cs typeface="+mj-cs"/>
         </a:defRPr>
       </a:lvl5pPr>
-      <a:lvl6pPr marL="2506000" indent="-228600" algn="l" defTabSz="457200" rtl="0" eaLnBrk="1" latinLnBrk="0" hangingPunct="1">
+      <a:lvl6pPr marL="2514642" indent="-228604" algn="l" defTabSz="457207" rtl="0" eaLnBrk="1" latinLnBrk="0" hangingPunct="1">
         <a:spcBef>
           <a:spcPts val="1000"/>
         </a:spcBef>
@@ -6545,7 +6691,7 @@
           <a:cs typeface="+mj-cs"/>
         </a:defRPr>
       </a:lvl6pPr>
-      <a:lvl7pPr marL="2971800" indent="-228600" algn="l" defTabSz="457200" rtl="0" eaLnBrk="1" latinLnBrk="0" hangingPunct="1">
+      <a:lvl7pPr marL="2971849" indent="-228604" algn="l" defTabSz="457207" rtl="0" eaLnBrk="1" latinLnBrk="0" hangingPunct="1">
         <a:spcBef>
           <a:spcPts val="1000"/>
         </a:spcBef>
@@ -6570,7 +6716,7 @@
           <a:cs typeface="+mj-cs"/>
         </a:defRPr>
       </a:lvl7pPr>
-      <a:lvl8pPr marL="3429000" indent="-228600" algn="l" defTabSz="457200" rtl="0" eaLnBrk="1" latinLnBrk="0" hangingPunct="1">
+      <a:lvl8pPr marL="3429057" indent="-228604" algn="l" defTabSz="457207" rtl="0" eaLnBrk="1" latinLnBrk="0" hangingPunct="1">
         <a:spcBef>
           <a:spcPts val="1000"/>
         </a:spcBef>
@@ -6595,7 +6741,7 @@
           <a:cs typeface="+mj-cs"/>
         </a:defRPr>
       </a:lvl8pPr>
-      <a:lvl9pPr marL="3886200" indent="-228600" algn="l" defTabSz="457200" rtl="0" eaLnBrk="1" latinLnBrk="0" hangingPunct="1">
+      <a:lvl9pPr marL="3886264" indent="-228604" algn="l" defTabSz="457207" rtl="0" eaLnBrk="1" latinLnBrk="0" hangingPunct="1">
         <a:spcBef>
           <a:spcPts val="1000"/>
         </a:spcBef>
@@ -6625,7 +6771,7 @@
       <a:defPPr>
         <a:defRPr lang="en-US"/>
       </a:defPPr>
-      <a:lvl1pPr marL="0" algn="l" defTabSz="457200" rtl="0" eaLnBrk="1" latinLnBrk="0" hangingPunct="1">
+      <a:lvl1pPr marL="0" algn="l" defTabSz="457207" rtl="0" eaLnBrk="1" latinLnBrk="0" hangingPunct="1">
         <a:defRPr sz="1800" kern="1200">
           <a:solidFill>
             <a:schemeClr val="tx1"/>
@@ -6635,7 +6781,7 @@
           <a:cs typeface="+mn-cs"/>
         </a:defRPr>
       </a:lvl1pPr>
-      <a:lvl2pPr marL="457200" algn="l" defTabSz="457200" rtl="0" eaLnBrk="1" latinLnBrk="0" hangingPunct="1">
+      <a:lvl2pPr marL="457207" algn="l" defTabSz="457207" rtl="0" eaLnBrk="1" latinLnBrk="0" hangingPunct="1">
         <a:defRPr sz="1800" kern="1200">
           <a:solidFill>
             <a:schemeClr val="tx1"/>
@@ -6645,7 +6791,7 @@
           <a:cs typeface="+mn-cs"/>
         </a:defRPr>
       </a:lvl2pPr>
-      <a:lvl3pPr marL="914400" algn="l" defTabSz="457200" rtl="0" eaLnBrk="1" latinLnBrk="0" hangingPunct="1">
+      <a:lvl3pPr marL="914415" algn="l" defTabSz="457207" rtl="0" eaLnBrk="1" latinLnBrk="0" hangingPunct="1">
         <a:defRPr sz="1800" kern="1200">
           <a:solidFill>
             <a:schemeClr val="tx1"/>
@@ -6655,7 +6801,7 @@
           <a:cs typeface="+mn-cs"/>
         </a:defRPr>
       </a:lvl3pPr>
-      <a:lvl4pPr marL="1371600" algn="l" defTabSz="457200" rtl="0" eaLnBrk="1" latinLnBrk="0" hangingPunct="1">
+      <a:lvl4pPr marL="1371622" algn="l" defTabSz="457207" rtl="0" eaLnBrk="1" latinLnBrk="0" hangingPunct="1">
         <a:defRPr sz="1800" kern="1200">
           <a:solidFill>
             <a:schemeClr val="tx1"/>
@@ -6665,7 +6811,7 @@
           <a:cs typeface="+mn-cs"/>
         </a:defRPr>
       </a:lvl4pPr>
-      <a:lvl5pPr marL="1828800" algn="l" defTabSz="457200" rtl="0" eaLnBrk="1" latinLnBrk="0" hangingPunct="1">
+      <a:lvl5pPr marL="1828831" algn="l" defTabSz="457207" rtl="0" eaLnBrk="1" latinLnBrk="0" hangingPunct="1">
         <a:defRPr sz="1800" kern="1200">
           <a:solidFill>
             <a:schemeClr val="tx1"/>
@@ -6675,7 +6821,7 @@
           <a:cs typeface="+mn-cs"/>
         </a:defRPr>
       </a:lvl5pPr>
-      <a:lvl6pPr marL="2286000" algn="l" defTabSz="457200" rtl="0" eaLnBrk="1" latinLnBrk="0" hangingPunct="1">
+      <a:lvl6pPr marL="2286038" algn="l" defTabSz="457207" rtl="0" eaLnBrk="1" latinLnBrk="0" hangingPunct="1">
         <a:defRPr sz="1800" kern="1200">
           <a:solidFill>
             <a:schemeClr val="tx1"/>
@@ -6685,7 +6831,7 @@
           <a:cs typeface="+mn-cs"/>
         </a:defRPr>
       </a:lvl6pPr>
-      <a:lvl7pPr marL="2743200" algn="l" defTabSz="457200" rtl="0" eaLnBrk="1" latinLnBrk="0" hangingPunct="1">
+      <a:lvl7pPr marL="2743246" algn="l" defTabSz="457207" rtl="0" eaLnBrk="1" latinLnBrk="0" hangingPunct="1">
         <a:defRPr sz="1800" kern="1200">
           <a:solidFill>
             <a:schemeClr val="tx1"/>
@@ -6695,7 +6841,7 @@
           <a:cs typeface="+mn-cs"/>
         </a:defRPr>
       </a:lvl7pPr>
-      <a:lvl8pPr marL="3200400" algn="l" defTabSz="457200" rtl="0" eaLnBrk="1" latinLnBrk="0" hangingPunct="1">
+      <a:lvl8pPr marL="3200453" algn="l" defTabSz="457207" rtl="0" eaLnBrk="1" latinLnBrk="0" hangingPunct="1">
         <a:defRPr sz="1800" kern="1200">
           <a:solidFill>
             <a:schemeClr val="tx1"/>
@@ -6705,7 +6851,7 @@
           <a:cs typeface="+mn-cs"/>
         </a:defRPr>
       </a:lvl8pPr>
-      <a:lvl9pPr marL="3657600" algn="l" defTabSz="457200" rtl="0" eaLnBrk="1" latinLnBrk="0" hangingPunct="1">
+      <a:lvl9pPr marL="3657661" algn="l" defTabSz="457207" rtl="0" eaLnBrk="1" latinLnBrk="0" hangingPunct="1">
         <a:defRPr sz="1800" kern="1200">
           <a:solidFill>
             <a:schemeClr val="tx1"/>
@@ -6745,7 +6891,7 @@
         </p:nvGrpSpPr>
         <p:grpSpPr>
           <a:xfrm>
-            <a:off x="2683400" y="4973402"/>
+            <a:off x="1159401" y="4973402"/>
             <a:ext cx="1776359" cy="1362846"/>
             <a:chOff x="4555066" y="5122333"/>
             <a:chExt cx="2065866" cy="1584960"/>
@@ -7386,7 +7532,7 @@
         </p:nvGrpSpPr>
         <p:grpSpPr>
           <a:xfrm>
-            <a:off x="7635236" y="4948636"/>
+            <a:off x="6111237" y="4948636"/>
             <a:ext cx="1776359" cy="1362846"/>
             <a:chOff x="4555066" y="5122333"/>
             <a:chExt cx="2065866" cy="1584960"/>
@@ -8027,7 +8173,7 @@
         </p:nvSpPr>
         <p:spPr>
           <a:xfrm>
-            <a:off x="1787469" y="946768"/>
+            <a:off x="263470" y="946768"/>
             <a:ext cx="2816225" cy="1066800"/>
           </a:xfrm>
           <a:prstGeom prst="cloud">
@@ -8064,14 +8210,14 @@
           <a:p>
             <a:pPr algn="r"/>
             <a:r>
-              <a:rPr lang="en-US" sz="1600" dirty="0" smtClean="0"/>
+              <a:rPr lang="en-US" sz="1600" dirty="0"/>
               <a:t>Repo on </a:t>
             </a:r>
             <a:br>
-              <a:rPr lang="en-US" sz="1600" dirty="0" smtClean="0"/>
+              <a:rPr lang="en-US" sz="1600" dirty="0"/>
             </a:br>
             <a:r>
-              <a:rPr lang="en-US" sz="1600" dirty="0" smtClean="0"/>
+              <a:rPr lang="en-US" sz="1600" dirty="0"/>
               <a:t>GitHub</a:t>
             </a:r>
             <a:endParaRPr lang="en-US" sz="1600" dirty="0"/>
@@ -8101,7 +8247,7 @@
         </p:blipFill>
         <p:spPr bwMode="auto">
           <a:xfrm>
-            <a:off x="2007322" y="1175368"/>
+            <a:off x="483322" y="1175368"/>
             <a:ext cx="1301372" cy="1081766"/>
           </a:xfrm>
           <a:prstGeom prst="rect">
@@ -8127,7 +8273,7 @@
         </p:nvGrpSpPr>
         <p:grpSpPr>
           <a:xfrm>
-            <a:off x="4832294" y="1415636"/>
+            <a:off x="3308294" y="1415636"/>
             <a:ext cx="1495212" cy="338554"/>
             <a:chOff x="3505200" y="1143000"/>
             <a:chExt cx="1495212" cy="338554"/>
@@ -8192,7 +8338,7 @@
             <a:lstStyle/>
             <a:p>
               <a:r>
-                <a:rPr lang="en-US" sz="1600" dirty="0" smtClean="0">
+                <a:rPr lang="en-US" sz="1600" dirty="0">
                   <a:solidFill>
                     <a:srgbClr val="FFFF00"/>
                   </a:solidFill>
@@ -8216,7 +8362,7 @@
         </p:nvSpPr>
         <p:spPr>
           <a:xfrm>
-            <a:off x="6595371" y="895968"/>
+            <a:off x="5071372" y="895968"/>
             <a:ext cx="2816225" cy="1066800"/>
           </a:xfrm>
           <a:prstGeom prst="cloud">
@@ -8274,7 +8420,7 @@
         </p:nvGrpSpPr>
         <p:grpSpPr>
           <a:xfrm>
-            <a:off x="7145352" y="2051668"/>
+            <a:off x="5621352" y="2051669"/>
             <a:ext cx="353944" cy="2059463"/>
             <a:chOff x="5818258" y="2019300"/>
             <a:chExt cx="353944" cy="2059463"/>
@@ -8339,7 +8485,7 @@
             <a:lstStyle/>
             <a:p>
               <a:r>
-                <a:rPr lang="en-US" sz="1600" dirty="0" smtClean="0">
+                <a:rPr lang="en-US" sz="1600" dirty="0">
                   <a:solidFill>
                     <a:srgbClr val="FFFF00"/>
                   </a:solidFill>
@@ -8363,7 +8509,7 @@
         </p:nvGrpSpPr>
         <p:grpSpPr>
           <a:xfrm>
-            <a:off x="7804094" y="2774882"/>
+            <a:off x="6280094" y="2774882"/>
             <a:ext cx="1302704" cy="796842"/>
             <a:chOff x="6477000" y="2742514"/>
             <a:chExt cx="1302704" cy="796842"/>
@@ -8392,28 +8538,12 @@
             <a:lstStyle/>
             <a:p>
               <a:r>
-                <a:rPr lang="en-US" sz="1600" dirty="0" smtClean="0">
+                <a:rPr lang="en-US" sz="1600" dirty="0">
                   <a:solidFill>
                     <a:srgbClr val="FFFF00"/>
                   </a:solidFill>
                 </a:rPr>
-                <a:t>3</a:t>
-              </a:r>
-              <a:r>
-                <a:rPr lang="en-US" sz="1600" dirty="0" smtClean="0">
-                  <a:solidFill>
-                    <a:srgbClr val="FFFF00"/>
-                  </a:solidFill>
-                </a:rPr>
-                <a:t>. </a:t>
-              </a:r>
-              <a:r>
-                <a:rPr lang="en-US" sz="1600" dirty="0" smtClean="0">
-                  <a:solidFill>
-                    <a:srgbClr val="FFFF00"/>
-                  </a:solidFill>
-                </a:rPr>
-                <a:t>commit</a:t>
+                <a:t>3. commit</a:t>
               </a:r>
               <a:endParaRPr lang="en-US" sz="1600" dirty="0">
                 <a:solidFill>
@@ -8524,7 +8654,7 @@
         </p:nvSpPr>
         <p:spPr>
           <a:xfrm>
-            <a:off x="7499294" y="4223368"/>
+            <a:off x="5975295" y="4223369"/>
             <a:ext cx="1839277" cy="528533"/>
           </a:xfrm>
           <a:prstGeom prst="can">
@@ -8561,7 +8691,7 @@
           <a:p>
             <a:pPr algn="ctr"/>
             <a:r>
-              <a:rPr lang="en-US" sz="1600" dirty="0" smtClean="0"/>
+              <a:rPr lang="en-US" sz="1600" dirty="0"/>
               <a:t>Local repo</a:t>
             </a:r>
             <a:endParaRPr lang="en-US" sz="1600" dirty="0"/>
@@ -8576,7 +8706,7 @@
         </p:nvGrpSpPr>
         <p:grpSpPr>
           <a:xfrm>
-            <a:off x="9174529" y="1962769"/>
+            <a:off x="7650529" y="1962769"/>
             <a:ext cx="406344" cy="2148362"/>
             <a:chOff x="7847435" y="1930401"/>
             <a:chExt cx="406344" cy="2148362"/>
@@ -8641,7 +8771,7 @@
             <a:lstStyle/>
             <a:p>
               <a:r>
-                <a:rPr lang="en-US" sz="1600" dirty="0" smtClean="0">
+                <a:rPr lang="en-US" sz="1600" dirty="0">
                   <a:solidFill>
                     <a:srgbClr val="FFFF00"/>
                   </a:solidFill>
@@ -8665,7 +8795,7 @@
         </p:nvGrpSpPr>
         <p:grpSpPr>
           <a:xfrm>
-            <a:off x="6782210" y="160440"/>
+            <a:off x="5258210" y="160440"/>
             <a:ext cx="2241084" cy="786328"/>
             <a:chOff x="5455116" y="128072"/>
             <a:chExt cx="2241084" cy="786328"/>
@@ -8786,7 +8916,7 @@
             <a:lstStyle/>
             <a:p>
               <a:r>
-                <a:rPr lang="en-US" sz="1600" dirty="0" smtClean="0">
+                <a:rPr lang="en-US" sz="1600" dirty="0">
                   <a:solidFill>
                     <a:srgbClr val="FFFF00"/>
                   </a:solidFill>
@@ -8810,7 +8940,7 @@
         </p:nvGrpSpPr>
         <p:grpSpPr>
           <a:xfrm>
-            <a:off x="4603694" y="871970"/>
+            <a:off x="3079694" y="871971"/>
             <a:ext cx="1828800" cy="395869"/>
             <a:chOff x="3352800" y="1661531"/>
             <a:chExt cx="1828800" cy="395869"/>
@@ -8876,7 +9006,7 @@
             <a:lstStyle/>
             <a:p>
               <a:r>
-                <a:rPr lang="en-US" sz="1600" dirty="0" smtClean="0">
+                <a:rPr lang="en-US" sz="1600" dirty="0">
                   <a:solidFill>
                     <a:srgbClr val="FFFF00"/>
                   </a:solidFill>
@@ -8900,7 +9030,7 @@
         </p:nvGrpSpPr>
         <p:grpSpPr>
           <a:xfrm>
-            <a:off x="3536894" y="2126205"/>
+            <a:off x="2012894" y="2126206"/>
             <a:ext cx="502672" cy="2059463"/>
             <a:chOff x="1780010" y="2171070"/>
             <a:chExt cx="502672" cy="2059463"/>
@@ -8965,7 +9095,7 @@
             <a:lstStyle/>
             <a:p>
               <a:r>
-                <a:rPr lang="en-US" sz="1600" dirty="0" smtClean="0">
+                <a:rPr lang="en-US" sz="1600" dirty="0">
                   <a:solidFill>
                     <a:srgbClr val="FFFF00"/>
                   </a:solidFill>
@@ -8989,7 +9119,7 @@
         </p:nvSpPr>
         <p:spPr>
           <a:xfrm>
-            <a:off x="2540208" y="4375767"/>
+            <a:off x="1016209" y="4375768"/>
             <a:ext cx="1839277" cy="528533"/>
           </a:xfrm>
           <a:prstGeom prst="can">
@@ -9040,7 +9170,7 @@
         </p:nvGrpSpPr>
         <p:grpSpPr>
           <a:xfrm>
-            <a:off x="9404294" y="4156500"/>
+            <a:off x="7880294" y="4156501"/>
             <a:ext cx="304800" cy="640399"/>
             <a:chOff x="8382000" y="4343400"/>
             <a:chExt cx="304800" cy="640399"/>
@@ -9191,7 +9321,7 @@
         </p:nvGrpSpPr>
         <p:grpSpPr>
           <a:xfrm>
-            <a:off x="9042238" y="255569"/>
+            <a:off x="7518238" y="255570"/>
             <a:ext cx="304800" cy="640399"/>
             <a:chOff x="8382000" y="4343400"/>
             <a:chExt cx="304800" cy="640399"/>
@@ -9342,7 +9472,7 @@
         </p:nvGrpSpPr>
         <p:grpSpPr>
           <a:xfrm>
-            <a:off x="4379485" y="343654"/>
+            <a:off x="2855485" y="343655"/>
             <a:ext cx="304800" cy="640399"/>
             <a:chOff x="8382000" y="4343400"/>
             <a:chExt cx="304800" cy="640399"/>
@@ -9493,7 +9623,7 @@
         </p:nvGrpSpPr>
         <p:grpSpPr>
           <a:xfrm>
-            <a:off x="3687163" y="3694835"/>
+            <a:off x="2163163" y="3694836"/>
             <a:ext cx="304800" cy="640399"/>
             <a:chOff x="8382000" y="4343400"/>
             <a:chExt cx="304800" cy="640399"/>
@@ -9644,7 +9774,7 @@
         </p:nvCxnSpPr>
         <p:spPr>
           <a:xfrm flipV="1">
-            <a:off x="3101767" y="2140271"/>
+            <a:off x="1577767" y="2140271"/>
             <a:ext cx="2" cy="2148362"/>
           </a:xfrm>
           <a:prstGeom prst="straightConnector1">
@@ -9680,7 +9810,7 @@
         </p:nvGrpSpPr>
         <p:grpSpPr>
           <a:xfrm>
-            <a:off x="4527494" y="3877255"/>
+            <a:off x="3003494" y="3877256"/>
             <a:ext cx="304800" cy="376133"/>
             <a:chOff x="8382000" y="4343400"/>
             <a:chExt cx="304800" cy="376133"/>
@@ -9782,7 +9912,7 @@
         </p:nvGrpSpPr>
         <p:grpSpPr>
           <a:xfrm>
-            <a:off x="4316627" y="2105026"/>
+            <a:off x="2792627" y="2105026"/>
             <a:ext cx="406344" cy="2148362"/>
             <a:chOff x="7847435" y="1930401"/>
             <a:chExt cx="406344" cy="2148362"/>
@@ -9847,7 +9977,7 @@
             <a:lstStyle/>
             <a:p>
               <a:r>
-                <a:rPr lang="en-US" sz="1600" dirty="0" smtClean="0">
+                <a:rPr lang="en-US" sz="1600" dirty="0">
                   <a:solidFill>
                     <a:srgbClr val="FFFF00"/>
                   </a:solidFill>
@@ -9871,7 +10001,7 @@
         </p:nvGrpSpPr>
         <p:grpSpPr>
           <a:xfrm>
-            <a:off x="4415210" y="1825501"/>
+            <a:off x="2891210" y="1825502"/>
             <a:ext cx="304800" cy="376133"/>
             <a:chOff x="8382000" y="4343400"/>
             <a:chExt cx="304800" cy="376133"/>
@@ -9973,7 +10103,7 @@
         </p:nvGrpSpPr>
         <p:grpSpPr>
           <a:xfrm rot="18977966">
-            <a:off x="4870135" y="2214273"/>
+            <a:off x="3346136" y="2214274"/>
             <a:ext cx="2259827" cy="1942227"/>
             <a:chOff x="796049" y="2682679"/>
             <a:chExt cx="2259827" cy="1942227"/>
@@ -10038,7 +10168,7 @@
             <a:lstStyle/>
             <a:p>
               <a:r>
-                <a:rPr lang="en-US" sz="1600" dirty="0" smtClean="0">
+                <a:rPr lang="en-US" sz="1600" dirty="0">
                   <a:solidFill>
                     <a:srgbClr val="FFFF00"/>
                   </a:solidFill>
@@ -10062,7 +10192,7 @@
         </p:nvGrpSpPr>
         <p:grpSpPr>
           <a:xfrm>
-            <a:off x="6825162" y="4305826"/>
+            <a:off x="5301162" y="4305827"/>
             <a:ext cx="304800" cy="376133"/>
             <a:chOff x="8382000" y="4343400"/>
             <a:chExt cx="304800" cy="376133"/>
@@ -10164,7 +10294,7 @@
         </p:nvSpPr>
         <p:spPr>
           <a:xfrm>
-            <a:off x="1802950" y="5073924"/>
+            <a:off x="278951" y="5073924"/>
             <a:ext cx="894797" cy="523220"/>
           </a:xfrm>
           <a:prstGeom prst="rect">
@@ -10179,14 +10309,14 @@
           <a:p>
             <a:pPr algn="ctr"/>
             <a:r>
-              <a:rPr lang="en-US" sz="1400" dirty="0" smtClean="0"/>
+              <a:rPr lang="en-US" sz="1400" dirty="0"/>
               <a:t>Tom </a:t>
             </a:r>
             <a:br>
-              <a:rPr lang="en-US" sz="1400" dirty="0" smtClean="0"/>
+              <a:rPr lang="en-US" sz="1400" dirty="0"/>
             </a:br>
             <a:r>
-              <a:rPr lang="en-US" sz="1400" dirty="0" smtClean="0"/>
+              <a:rPr lang="en-US" sz="1400" dirty="0"/>
               <a:t>[Owner]</a:t>
             </a:r>
             <a:endParaRPr lang="en-US" sz="1400" dirty="0"/>
@@ -10201,7 +10331,7 @@
         </p:nvSpPr>
         <p:spPr>
           <a:xfrm>
-            <a:off x="9438673" y="5084456"/>
+            <a:off x="7814572" y="4908832"/>
             <a:ext cx="1295546" cy="523220"/>
           </a:xfrm>
           <a:prstGeom prst="rect">
@@ -10216,14 +10346,14 @@
           <a:p>
             <a:pPr algn="ctr"/>
             <a:r>
-              <a:rPr lang="en-US" sz="1400" dirty="0" smtClean="0"/>
+              <a:rPr lang="en-US" sz="1400" dirty="0"/>
               <a:t>Jane</a:t>
             </a:r>
             <a:br>
-              <a:rPr lang="en-US" sz="1400" dirty="0" smtClean="0"/>
+              <a:rPr lang="en-US" sz="1400" dirty="0"/>
             </a:br>
             <a:r>
-              <a:rPr lang="en-US" sz="1400" dirty="0" smtClean="0"/>
+              <a:rPr lang="en-US" sz="1400" dirty="0"/>
               <a:t>[Contributor]</a:t>
             </a:r>
             <a:endParaRPr lang="en-US" sz="1400" dirty="0"/>
@@ -10232,14 +10362,14 @@
       </p:sp>
       <p:sp>
         <p:nvSpPr>
-          <p:cNvPr id="163" name="PowerPointLabs Caption 0"/>
+          <p:cNvPr id="2" name="PowerPointLabs Caption 0"/>
           <p:cNvSpPr txBox="1"/>
           <p:nvPr/>
         </p:nvSpPr>
         <p:spPr>
           <a:xfrm>
             <a:off x="0" y="6581001"/>
-            <a:ext cx="12192000" cy="276999"/>
+            <a:ext cx="9144000" cy="276999"/>
           </a:xfrm>
           <a:prstGeom prst="rect">
             <a:avLst/>
@@ -10282,14 +10412,14 @@
       </p:sp>
       <p:sp>
         <p:nvSpPr>
-          <p:cNvPr id="164" name="PowerPointLabs Caption 1"/>
+          <p:cNvPr id="3" name="PowerPointLabs Caption 1"/>
           <p:cNvSpPr txBox="1"/>
           <p:nvPr/>
         </p:nvSpPr>
         <p:spPr>
           <a:xfrm>
             <a:off x="0" y="6581001"/>
-            <a:ext cx="12192000" cy="276999"/>
+            <a:ext cx="9144000" cy="276999"/>
           </a:xfrm>
           <a:prstGeom prst="rect">
             <a:avLst/>
@@ -10332,14 +10462,14 @@
       </p:sp>
       <p:sp>
         <p:nvSpPr>
-          <p:cNvPr id="165" name="PowerPointLabs Caption 2"/>
+          <p:cNvPr id="21" name="PowerPointLabs Caption 2"/>
           <p:cNvSpPr txBox="1"/>
           <p:nvPr/>
         </p:nvSpPr>
         <p:spPr>
           <a:xfrm>
             <a:off x="0" y="6581001"/>
-            <a:ext cx="12192000" cy="276999"/>
+            <a:ext cx="9144000" cy="276999"/>
           </a:xfrm>
           <a:prstGeom prst="rect">
             <a:avLst/>
@@ -10382,14 +10512,14 @@
       </p:sp>
       <p:sp>
         <p:nvSpPr>
-          <p:cNvPr id="166" name="PowerPointLabs Caption 3"/>
+          <p:cNvPr id="22" name="PowerPointLabs Caption 3"/>
           <p:cNvSpPr txBox="1"/>
           <p:nvPr/>
         </p:nvSpPr>
         <p:spPr>
           <a:xfrm>
             <a:off x="0" y="6581001"/>
-            <a:ext cx="12192000" cy="276999"/>
+            <a:ext cx="9144000" cy="276999"/>
           </a:xfrm>
           <a:prstGeom prst="rect">
             <a:avLst/>
@@ -10432,14 +10562,14 @@
       </p:sp>
       <p:sp>
         <p:nvSpPr>
-          <p:cNvPr id="167" name="PowerPointLabs Caption 4"/>
+          <p:cNvPr id="80" name="PowerPointLabs Caption 4"/>
           <p:cNvSpPr txBox="1"/>
           <p:nvPr/>
         </p:nvSpPr>
         <p:spPr>
           <a:xfrm>
             <a:off x="0" y="6581001"/>
-            <a:ext cx="12192000" cy="276999"/>
+            <a:ext cx="9144000" cy="276999"/>
           </a:xfrm>
           <a:prstGeom prst="rect">
             <a:avLst/>
@@ -10482,14 +10612,14 @@
       </p:sp>
       <p:sp>
         <p:nvSpPr>
-          <p:cNvPr id="168" name="PowerPointLabs Caption 5"/>
+          <p:cNvPr id="81" name="PowerPointLabs Caption 5"/>
           <p:cNvSpPr txBox="1"/>
           <p:nvPr/>
         </p:nvSpPr>
         <p:spPr>
           <a:xfrm>
             <a:off x="0" y="6581001"/>
-            <a:ext cx="12192000" cy="276999"/>
+            <a:ext cx="9144000" cy="276999"/>
           </a:xfrm>
           <a:prstGeom prst="rect">
             <a:avLst/>
@@ -10532,14 +10662,14 @@
       </p:sp>
       <p:sp>
         <p:nvSpPr>
-          <p:cNvPr id="169" name="PowerPointLabs Caption 6"/>
+          <p:cNvPr id="82" name="PowerPointLabs Caption 6"/>
           <p:cNvSpPr txBox="1"/>
           <p:nvPr/>
         </p:nvSpPr>
         <p:spPr>
           <a:xfrm>
             <a:off x="0" y="6581001"/>
-            <a:ext cx="12192000" cy="276999"/>
+            <a:ext cx="9144000" cy="276999"/>
           </a:xfrm>
           <a:prstGeom prst="rect">
             <a:avLst/>
@@ -10582,14 +10712,14 @@
       </p:sp>
       <p:sp>
         <p:nvSpPr>
-          <p:cNvPr id="170" name="PowerPointLabs Caption 7"/>
+          <p:cNvPr id="85" name="PowerPointLabs Caption 7"/>
           <p:cNvSpPr txBox="1"/>
           <p:nvPr/>
         </p:nvSpPr>
         <p:spPr>
           <a:xfrm>
-            <a:off x="0" y="6581001"/>
-            <a:ext cx="12192000" cy="276999"/>
+            <a:off x="0" y="6396335"/>
+            <a:ext cx="9144000" cy="461665"/>
           </a:xfrm>
           <a:prstGeom prst="rect">
             <a:avLst/>
@@ -10632,14 +10762,14 @@
       </p:sp>
       <p:sp>
         <p:nvSpPr>
-          <p:cNvPr id="171" name="PowerPointLabs Caption 8"/>
+          <p:cNvPr id="86" name="PowerPointLabs Caption 8"/>
           <p:cNvSpPr txBox="1"/>
           <p:nvPr/>
         </p:nvSpPr>
         <p:spPr>
           <a:xfrm>
             <a:off x="0" y="6581001"/>
-            <a:ext cx="12192000" cy="276999"/>
+            <a:ext cx="9144000" cy="276999"/>
           </a:xfrm>
           <a:prstGeom prst="rect">
             <a:avLst/>
@@ -10682,14 +10812,14 @@
       </p:sp>
       <p:sp>
         <p:nvSpPr>
-          <p:cNvPr id="172" name="PowerPointLabs Caption 9"/>
+          <p:cNvPr id="87" name="PowerPointLabs Caption 9"/>
           <p:cNvSpPr txBox="1"/>
           <p:nvPr/>
         </p:nvSpPr>
         <p:spPr>
           <a:xfrm>
             <a:off x="0" y="6581001"/>
-            <a:ext cx="12192000" cy="276999"/>
+            <a:ext cx="9144000" cy="276999"/>
           </a:xfrm>
           <a:prstGeom prst="rect">
             <a:avLst/>
@@ -10732,14 +10862,14 @@
       </p:sp>
       <p:sp>
         <p:nvSpPr>
-          <p:cNvPr id="173" name="PowerPointLabs Caption 10"/>
+          <p:cNvPr id="88" name="PowerPointLabs Caption 10"/>
           <p:cNvSpPr txBox="1"/>
           <p:nvPr/>
         </p:nvSpPr>
         <p:spPr>
           <a:xfrm>
-            <a:off x="0" y="6581001"/>
-            <a:ext cx="12192000" cy="276999"/>
+            <a:off x="0" y="6396335"/>
+            <a:ext cx="9144000" cy="461665"/>
           </a:xfrm>
           <a:prstGeom prst="rect">
             <a:avLst/>
@@ -10782,14 +10912,14 @@
       </p:sp>
       <p:sp>
         <p:nvSpPr>
-          <p:cNvPr id="174" name="PowerPointLabs Caption 11"/>
+          <p:cNvPr id="89" name="PowerPointLabs Caption 11"/>
           <p:cNvSpPr txBox="1"/>
           <p:nvPr/>
         </p:nvSpPr>
         <p:spPr>
           <a:xfrm>
             <a:off x="0" y="6581001"/>
-            <a:ext cx="12192000" cy="276999"/>
+            <a:ext cx="9144000" cy="276999"/>
           </a:xfrm>
           <a:prstGeom prst="rect">
             <a:avLst/>
@@ -10832,14 +10962,14 @@
       </p:sp>
       <p:sp>
         <p:nvSpPr>
-          <p:cNvPr id="175" name="PowerPointLabs Caption 12"/>
+          <p:cNvPr id="90" name="PowerPointLabs Caption 12"/>
           <p:cNvSpPr txBox="1"/>
           <p:nvPr/>
         </p:nvSpPr>
         <p:spPr>
           <a:xfrm>
             <a:off x="0" y="6581001"/>
-            <a:ext cx="12192000" cy="276999"/>
+            <a:ext cx="9144000" cy="276999"/>
           </a:xfrm>
           <a:prstGeom prst="rect">
             <a:avLst/>
@@ -10882,14 +11012,14 @@
       </p:sp>
       <p:sp>
         <p:nvSpPr>
-          <p:cNvPr id="176" name="PowerPointLabs Caption 13"/>
+          <p:cNvPr id="91" name="PowerPointLabs Caption 13"/>
           <p:cNvSpPr txBox="1"/>
           <p:nvPr/>
         </p:nvSpPr>
         <p:spPr>
           <a:xfrm>
             <a:off x="0" y="6581001"/>
-            <a:ext cx="12192000" cy="276999"/>
+            <a:ext cx="9144000" cy="276999"/>
           </a:xfrm>
           <a:prstGeom prst="rect">
             <a:avLst/>
@@ -10932,14 +11062,14 @@
       </p:sp>
       <p:sp>
         <p:nvSpPr>
-          <p:cNvPr id="177" name="PowerPointLabs Caption 14"/>
+          <p:cNvPr id="92" name="PowerPointLabs Caption 14"/>
           <p:cNvSpPr txBox="1"/>
           <p:nvPr/>
         </p:nvSpPr>
         <p:spPr>
           <a:xfrm>
             <a:off x="0" y="6581001"/>
-            <a:ext cx="12192000" cy="276999"/>
+            <a:ext cx="9144000" cy="276999"/>
           </a:xfrm>
           <a:prstGeom prst="rect">
             <a:avLst/>
@@ -10982,14 +11112,14 @@
       </p:sp>
       <p:sp>
         <p:nvSpPr>
-          <p:cNvPr id="178" name="PowerPointLabs Caption 15"/>
+          <p:cNvPr id="93" name="PowerPointLabs Caption 15"/>
           <p:cNvSpPr txBox="1"/>
           <p:nvPr/>
         </p:nvSpPr>
         <p:spPr>
           <a:xfrm>
             <a:off x="0" y="6581001"/>
-            <a:ext cx="12192000" cy="276999"/>
+            <a:ext cx="9144000" cy="276999"/>
           </a:xfrm>
           <a:prstGeom prst="rect">
             <a:avLst/>
@@ -11032,14 +11162,14 @@
       </p:sp>
       <p:sp>
         <p:nvSpPr>
-          <p:cNvPr id="179" name="PowerPointLabs Caption 16"/>
+          <p:cNvPr id="94" name="PowerPointLabs Caption 16"/>
           <p:cNvSpPr txBox="1"/>
           <p:nvPr/>
         </p:nvSpPr>
         <p:spPr>
           <a:xfrm>
             <a:off x="0" y="6581001"/>
-            <a:ext cx="12192000" cy="276999"/>
+            <a:ext cx="9144000" cy="276999"/>
           </a:xfrm>
           <a:prstGeom prst="rect">
             <a:avLst/>
@@ -11127,7 +11257,7 @@
                                           </p:stCondLst>
                                         </p:cTn>
                                         <p:tgtEl>
-                                          <p:spTgt spid="163"/>
+                                          <p:spTgt spid="2"/>
                                         </p:tgtEl>
                                         <p:attrNameLst>
                                           <p:attrName>style.visibility</p:attrName>
@@ -11141,7 +11271,7 @@
                                       <p:cBhvr>
                                         <p:cTn id="7" dur="500"/>
                                         <p:tgtEl>
-                                          <p:spTgt spid="163"/>
+                                          <p:spTgt spid="2"/>
                                         </p:tgtEl>
                                       </p:cBhvr>
                                     </p:animEffect>
@@ -11285,7 +11415,7 @@
                                           </p:stCondLst>
                                         </p:cTn>
                                         <p:tgtEl>
-                                          <p:spTgt spid="164"/>
+                                          <p:spTgt spid="3"/>
                                         </p:tgtEl>
                                         <p:attrNameLst>
                                           <p:attrName>style.visibility</p:attrName>
@@ -11312,7 +11442,7 @@
                                           </p:stCondLst>
                                         </p:cTn>
                                         <p:tgtEl>
-                                          <p:spTgt spid="163"/>
+                                          <p:spTgt spid="2"/>
                                         </p:tgtEl>
                                         <p:attrNameLst>
                                           <p:attrName>style.visibility</p:attrName>
@@ -11427,7 +11557,7 @@
                                           </p:stCondLst>
                                         </p:cTn>
                                         <p:tgtEl>
-                                          <p:spTgt spid="165"/>
+                                          <p:spTgt spid="21"/>
                                         </p:tgtEl>
                                         <p:attrNameLst>
                                           <p:attrName>style.visibility</p:attrName>
@@ -11454,7 +11584,7 @@
                                           </p:stCondLst>
                                         </p:cTn>
                                         <p:tgtEl>
-                                          <p:spTgt spid="164"/>
+                                          <p:spTgt spid="3"/>
                                         </p:tgtEl>
                                         <p:attrNameLst>
                                           <p:attrName>style.visibility</p:attrName>
@@ -11534,7 +11664,7 @@
                                           </p:stCondLst>
                                         </p:cTn>
                                         <p:tgtEl>
-                                          <p:spTgt spid="166"/>
+                                          <p:spTgt spid="22"/>
                                         </p:tgtEl>
                                         <p:attrNameLst>
                                           <p:attrName>style.visibility</p:attrName>
@@ -11561,7 +11691,7 @@
                                           </p:stCondLst>
                                         </p:cTn>
                                         <p:tgtEl>
-                                          <p:spTgt spid="165"/>
+                                          <p:spTgt spid="21"/>
                                         </p:tgtEl>
                                         <p:attrNameLst>
                                           <p:attrName>style.visibility</p:attrName>
@@ -11641,7 +11771,7 @@
                                           </p:stCondLst>
                                         </p:cTn>
                                         <p:tgtEl>
-                                          <p:spTgt spid="167"/>
+                                          <p:spTgt spid="80"/>
                                         </p:tgtEl>
                                         <p:attrNameLst>
                                           <p:attrName>style.visibility</p:attrName>
@@ -11668,7 +11798,7 @@
                                           </p:stCondLst>
                                         </p:cTn>
                                         <p:tgtEl>
-                                          <p:spTgt spid="166"/>
+                                          <p:spTgt spid="22"/>
                                         </p:tgtEl>
                                         <p:attrNameLst>
                                           <p:attrName>style.visibility</p:attrName>
@@ -11748,7 +11878,7 @@
                                           </p:stCondLst>
                                         </p:cTn>
                                         <p:tgtEl>
-                                          <p:spTgt spid="168"/>
+                                          <p:spTgt spid="81"/>
                                         </p:tgtEl>
                                         <p:attrNameLst>
                                           <p:attrName>style.visibility</p:attrName>
@@ -11775,7 +11905,7 @@
                                           </p:stCondLst>
                                         </p:cTn>
                                         <p:tgtEl>
-                                          <p:spTgt spid="167"/>
+                                          <p:spTgt spid="80"/>
                                         </p:tgtEl>
                                         <p:attrNameLst>
                                           <p:attrName>style.visibility</p:attrName>
@@ -11855,7 +11985,7 @@
                                           </p:stCondLst>
                                         </p:cTn>
                                         <p:tgtEl>
-                                          <p:spTgt spid="169"/>
+                                          <p:spTgt spid="82"/>
                                         </p:tgtEl>
                                         <p:attrNameLst>
                                           <p:attrName>style.visibility</p:attrName>
@@ -11882,7 +12012,7 @@
                                           </p:stCondLst>
                                         </p:cTn>
                                         <p:tgtEl>
-                                          <p:spTgt spid="168"/>
+                                          <p:spTgt spid="81"/>
                                         </p:tgtEl>
                                         <p:attrNameLst>
                                           <p:attrName>style.visibility</p:attrName>
@@ -12006,7 +12136,7 @@
                                           </p:stCondLst>
                                         </p:cTn>
                                         <p:tgtEl>
-                                          <p:spTgt spid="170"/>
+                                          <p:spTgt spid="85"/>
                                         </p:tgtEl>
                                         <p:attrNameLst>
                                           <p:attrName>style.visibility</p:attrName>
@@ -12033,7 +12163,7 @@
                                           </p:stCondLst>
                                         </p:cTn>
                                         <p:tgtEl>
-                                          <p:spTgt spid="169"/>
+                                          <p:spTgt spid="82"/>
                                         </p:tgtEl>
                                         <p:attrNameLst>
                                           <p:attrName>style.visibility</p:attrName>
@@ -12113,7 +12243,7 @@
                                           </p:stCondLst>
                                         </p:cTn>
                                         <p:tgtEl>
-                                          <p:spTgt spid="171"/>
+                                          <p:spTgt spid="86"/>
                                         </p:tgtEl>
                                         <p:attrNameLst>
                                           <p:attrName>style.visibility</p:attrName>
@@ -12140,7 +12270,7 @@
                                           </p:stCondLst>
                                         </p:cTn>
                                         <p:tgtEl>
-                                          <p:spTgt spid="170"/>
+                                          <p:spTgt spid="85"/>
                                         </p:tgtEl>
                                         <p:attrNameLst>
                                           <p:attrName>style.visibility</p:attrName>
@@ -12220,7 +12350,7 @@
                                           </p:stCondLst>
                                         </p:cTn>
                                         <p:tgtEl>
-                                          <p:spTgt spid="172"/>
+                                          <p:spTgt spid="87"/>
                                         </p:tgtEl>
                                         <p:attrNameLst>
                                           <p:attrName>style.visibility</p:attrName>
@@ -12247,7 +12377,7 @@
                                           </p:stCondLst>
                                         </p:cTn>
                                         <p:tgtEl>
-                                          <p:spTgt spid="171"/>
+                                          <p:spTgt spid="86"/>
                                         </p:tgtEl>
                                         <p:attrNameLst>
                                           <p:attrName>style.visibility</p:attrName>
@@ -12327,7 +12457,7 @@
                                           </p:stCondLst>
                                         </p:cTn>
                                         <p:tgtEl>
-                                          <p:spTgt spid="173"/>
+                                          <p:spTgt spid="88"/>
                                         </p:tgtEl>
                                         <p:attrNameLst>
                                           <p:attrName>style.visibility</p:attrName>
@@ -12354,7 +12484,7 @@
                                           </p:stCondLst>
                                         </p:cTn>
                                         <p:tgtEl>
-                                          <p:spTgt spid="172"/>
+                                          <p:spTgt spid="87"/>
                                         </p:tgtEl>
                                         <p:attrNameLst>
                                           <p:attrName>style.visibility</p:attrName>
@@ -12434,7 +12564,7 @@
                                           </p:stCondLst>
                                         </p:cTn>
                                         <p:tgtEl>
-                                          <p:spTgt spid="174"/>
+                                          <p:spTgt spid="89"/>
                                         </p:tgtEl>
                                         <p:attrNameLst>
                                           <p:attrName>style.visibility</p:attrName>
@@ -12461,7 +12591,7 @@
                                           </p:stCondLst>
                                         </p:cTn>
                                         <p:tgtEl>
-                                          <p:spTgt spid="173"/>
+                                          <p:spTgt spid="88"/>
                                         </p:tgtEl>
                                         <p:attrNameLst>
                                           <p:attrName>style.visibility</p:attrName>
@@ -12541,7 +12671,7 @@
                                           </p:stCondLst>
                                         </p:cTn>
                                         <p:tgtEl>
-                                          <p:spTgt spid="175"/>
+                                          <p:spTgt spid="90"/>
                                         </p:tgtEl>
                                         <p:attrNameLst>
                                           <p:attrName>style.visibility</p:attrName>
@@ -12568,7 +12698,7 @@
                                           </p:stCondLst>
                                         </p:cTn>
                                         <p:tgtEl>
-                                          <p:spTgt spid="174"/>
+                                          <p:spTgt spid="89"/>
                                         </p:tgtEl>
                                         <p:attrNameLst>
                                           <p:attrName>style.visibility</p:attrName>
@@ -12692,7 +12822,7 @@
                                           </p:stCondLst>
                                         </p:cTn>
                                         <p:tgtEl>
-                                          <p:spTgt spid="176"/>
+                                          <p:spTgt spid="91"/>
                                         </p:tgtEl>
                                         <p:attrNameLst>
                                           <p:attrName>style.visibility</p:attrName>
@@ -12719,7 +12849,7 @@
                                           </p:stCondLst>
                                         </p:cTn>
                                         <p:tgtEl>
-                                          <p:spTgt spid="175"/>
+                                          <p:spTgt spid="90"/>
                                         </p:tgtEl>
                                         <p:attrNameLst>
                                           <p:attrName>style.visibility</p:attrName>
@@ -12799,7 +12929,7 @@
                                           </p:stCondLst>
                                         </p:cTn>
                                         <p:tgtEl>
-                                          <p:spTgt spid="177"/>
+                                          <p:spTgt spid="92"/>
                                         </p:tgtEl>
                                         <p:attrNameLst>
                                           <p:attrName>style.visibility</p:attrName>
@@ -12826,7 +12956,7 @@
                                           </p:stCondLst>
                                         </p:cTn>
                                         <p:tgtEl>
-                                          <p:spTgt spid="176"/>
+                                          <p:spTgt spid="91"/>
                                         </p:tgtEl>
                                         <p:attrNameLst>
                                           <p:attrName>style.visibility</p:attrName>
@@ -12950,7 +13080,7 @@
                                           </p:stCondLst>
                                         </p:cTn>
                                         <p:tgtEl>
-                                          <p:spTgt spid="178"/>
+                                          <p:spTgt spid="93"/>
                                         </p:tgtEl>
                                         <p:attrNameLst>
                                           <p:attrName>style.visibility</p:attrName>
@@ -12977,7 +13107,7 @@
                                           </p:stCondLst>
                                         </p:cTn>
                                         <p:tgtEl>
-                                          <p:spTgt spid="177"/>
+                                          <p:spTgt spid="92"/>
                                         </p:tgtEl>
                                         <p:attrNameLst>
                                           <p:attrName>style.visibility</p:attrName>
@@ -13101,7 +13231,7 @@
                                           </p:stCondLst>
                                         </p:cTn>
                                         <p:tgtEl>
-                                          <p:spTgt spid="179"/>
+                                          <p:spTgt spid="94"/>
                                         </p:tgtEl>
                                         <p:attrNameLst>
                                           <p:attrName>style.visibility</p:attrName>
@@ -13128,7 +13258,7 @@
                                           </p:stCondLst>
                                         </p:cTn>
                                         <p:tgtEl>
-                                          <p:spTgt spid="178"/>
+                                          <p:spTgt spid="93"/>
                                         </p:tgtEl>
                                         <p:attrNameLst>
                                           <p:attrName>style.visibility</p:attrName>
@@ -13173,39 +13303,39 @@
       <p:bldP spid="27" grpId="0" animBg="1"/>
       <p:bldP spid="34" grpId="0" animBg="1"/>
       <p:bldP spid="84" grpId="0"/>
-      <p:bldP spid="163" grpId="0" animBg="1"/>
-      <p:bldP spid="163" grpId="1" animBg="1"/>
-      <p:bldP spid="164" grpId="0" animBg="1"/>
-      <p:bldP spid="164" grpId="1" animBg="1"/>
-      <p:bldP spid="165" grpId="0" animBg="1"/>
-      <p:bldP spid="165" grpId="1" animBg="1"/>
-      <p:bldP spid="166" grpId="0" animBg="1"/>
-      <p:bldP spid="166" grpId="1" animBg="1"/>
-      <p:bldP spid="167" grpId="0" animBg="1"/>
-      <p:bldP spid="167" grpId="1" animBg="1"/>
-      <p:bldP spid="168" grpId="0" animBg="1"/>
-      <p:bldP spid="168" grpId="1" animBg="1"/>
-      <p:bldP spid="169" grpId="0" animBg="1"/>
-      <p:bldP spid="169" grpId="1" animBg="1"/>
-      <p:bldP spid="170" grpId="0" animBg="1"/>
-      <p:bldP spid="170" grpId="1" animBg="1"/>
-      <p:bldP spid="171" grpId="0" animBg="1"/>
-      <p:bldP spid="171" grpId="1" animBg="1"/>
-      <p:bldP spid="172" grpId="0" animBg="1"/>
-      <p:bldP spid="172" grpId="1" animBg="1"/>
-      <p:bldP spid="173" grpId="0" animBg="1"/>
-      <p:bldP spid="173" grpId="1" animBg="1"/>
-      <p:bldP spid="174" grpId="0" animBg="1"/>
-      <p:bldP spid="174" grpId="1" animBg="1"/>
-      <p:bldP spid="175" grpId="0" animBg="1"/>
-      <p:bldP spid="175" grpId="1" animBg="1"/>
-      <p:bldP spid="176" grpId="0" animBg="1"/>
-      <p:bldP spid="176" grpId="1" animBg="1"/>
-      <p:bldP spid="177" grpId="0" animBg="1"/>
-      <p:bldP spid="177" grpId="1" animBg="1"/>
-      <p:bldP spid="178" grpId="0" animBg="1"/>
-      <p:bldP spid="178" grpId="1" animBg="1"/>
-      <p:bldP spid="179" grpId="0" animBg="1"/>
+      <p:bldP spid="2" grpId="0" animBg="1"/>
+      <p:bldP spid="2" grpId="1" animBg="1"/>
+      <p:bldP spid="3" grpId="0" animBg="1"/>
+      <p:bldP spid="3" grpId="1" animBg="1"/>
+      <p:bldP spid="21" grpId="0" animBg="1"/>
+      <p:bldP spid="21" grpId="1" animBg="1"/>
+      <p:bldP spid="22" grpId="0" animBg="1"/>
+      <p:bldP spid="22" grpId="1" animBg="1"/>
+      <p:bldP spid="80" grpId="0" animBg="1"/>
+      <p:bldP spid="80" grpId="1" animBg="1"/>
+      <p:bldP spid="81" grpId="0" animBg="1"/>
+      <p:bldP spid="81" grpId="1" animBg="1"/>
+      <p:bldP spid="82" grpId="0" animBg="1"/>
+      <p:bldP spid="82" grpId="1" animBg="1"/>
+      <p:bldP spid="85" grpId="0" animBg="1"/>
+      <p:bldP spid="85" grpId="1" animBg="1"/>
+      <p:bldP spid="86" grpId="0" animBg="1"/>
+      <p:bldP spid="86" grpId="1" animBg="1"/>
+      <p:bldP spid="87" grpId="0" animBg="1"/>
+      <p:bldP spid="87" grpId="1" animBg="1"/>
+      <p:bldP spid="88" grpId="0" animBg="1"/>
+      <p:bldP spid="88" grpId="1" animBg="1"/>
+      <p:bldP spid="89" grpId="0" animBg="1"/>
+      <p:bldP spid="89" grpId="1" animBg="1"/>
+      <p:bldP spid="90" grpId="0" animBg="1"/>
+      <p:bldP spid="90" grpId="1" animBg="1"/>
+      <p:bldP spid="91" grpId="0" animBg="1"/>
+      <p:bldP spid="91" grpId="1" animBg="1"/>
+      <p:bldP spid="92" grpId="0" animBg="1"/>
+      <p:bldP spid="92" grpId="1" animBg="1"/>
+      <p:bldP spid="93" grpId="0" animBg="1"/>
+      <p:bldP spid="93" grpId="1" animBg="1"/>
+      <p:bldP spid="94" grpId="0" animBg="1"/>
     </p:bldLst>
   </p:timing>
 </p:sld>
@@ -13240,7 +13370,7 @@
         <a:srgbClr val="6AAC90"/>
       </a:accent4>
       <a:accent5>
-        <a:srgbClr val="54849A"/>
+        <a:srgbClr val="5F9C9D"/>
       </a:accent5>
       <a:accent6>
         <a:srgbClr val="9E5E9B"/>
@@ -13249,7 +13379,7 @@
         <a:srgbClr val="58C1BA"/>
       </a:hlink>
       <a:folHlink>
-        <a:srgbClr val="9DFFCB"/>
+        <a:srgbClr val="9DD0CB"/>
       </a:folHlink>
     </a:clrScheme>
     <a:fontScheme name="Ion">

</xml_diff>